<commit_message>
Update domain_BD and presentation_2_Luis
</commit_message>
<xml_diff>
--- a/Report/presentation_2_Luis.pptx
+++ b/Report/presentation_2_Luis.pptx
@@ -5,21 +5,16 @@
     <p:sldMasterId id="2147483672" r:id="rId1"/>
   </p:sldMasterIdLst>
   <p:notesMasterIdLst>
-    <p:notesMasterId r:id="rId14"/>
+    <p:notesMasterId r:id="rId9"/>
   </p:notesMasterIdLst>
   <p:sldIdLst>
     <p:sldId id="256" r:id="rId2"/>
     <p:sldId id="257" r:id="rId3"/>
     <p:sldId id="258" r:id="rId4"/>
     <p:sldId id="259" r:id="rId5"/>
-    <p:sldId id="260" r:id="rId6"/>
-    <p:sldId id="262" r:id="rId7"/>
-    <p:sldId id="267" r:id="rId8"/>
-    <p:sldId id="266" r:id="rId9"/>
-    <p:sldId id="263" r:id="rId10"/>
-    <p:sldId id="264" r:id="rId11"/>
-    <p:sldId id="269" r:id="rId12"/>
-    <p:sldId id="268" r:id="rId13"/>
+    <p:sldId id="270" r:id="rId6"/>
+    <p:sldId id="264" r:id="rId7"/>
+    <p:sldId id="268" r:id="rId8"/>
   </p:sldIdLst>
   <p:sldSz cx="12192000" cy="6858000"/>
   <p:notesSz cx="6858000" cy="9144000"/>
@@ -208,7 +203,7 @@
           <a:p>
             <a:fld id="{FDDF5FE0-F804-4E91-803A-7CECEE48BB95}" type="datetimeFigureOut">
               <a:rPr lang="pt-PT" smtClean="0"/>
-              <a:t>27/03/2019</a:t>
+              <a:t>27/05/2019</a:t>
             </a:fld>
             <a:endParaRPr lang="pt-PT"/>
           </a:p>
@@ -542,7 +537,7 @@
               <a:rPr lang="pt-PT" smtClean="0"/>
               <a:t>1</a:t>
             </a:fld>
-            <a:endParaRPr lang="pt-PT"/>
+            <a:endParaRPr lang="pt-PT" dirty="0"/>
           </a:p>
         </p:txBody>
       </p:sp>
@@ -550,356 +545,6 @@
     <p:extLst>
       <p:ext uri="{BB962C8B-B14F-4D97-AF65-F5344CB8AC3E}">
         <p14:creationId xmlns:p14="http://schemas.microsoft.com/office/powerpoint/2010/main" val="3089481180"/>
-      </p:ext>
-    </p:extLst>
-  </p:cSld>
-  <p:clrMapOvr>
-    <a:masterClrMapping/>
-  </p:clrMapOvr>
-</p:notes>
-</file>
-
-<file path=ppt/notesSlides/notesSlide10.xml><?xml version="1.0" encoding="utf-8"?>
-<p:notes xmlns:a="http://schemas.openxmlformats.org/drawingml/2006/main" xmlns:r="http://schemas.openxmlformats.org/officeDocument/2006/relationships" xmlns:p="http://schemas.openxmlformats.org/presentationml/2006/main">
-  <p:cSld>
-    <p:spTree>
-      <p:nvGrpSpPr>
-        <p:cNvPr id="1" name=""/>
-        <p:cNvGrpSpPr/>
-        <p:nvPr/>
-      </p:nvGrpSpPr>
-      <p:grpSpPr>
-        <a:xfrm>
-          <a:off x="0" y="0"/>
-          <a:ext cx="0" cy="0"/>
-          <a:chOff x="0" y="0"/>
-          <a:chExt cx="0" cy="0"/>
-        </a:xfrm>
-      </p:grpSpPr>
-      <p:sp>
-        <p:nvSpPr>
-          <p:cNvPr id="2" name="Marcador de Posição da Imagem do Diapositivo 1"/>
-          <p:cNvSpPr>
-            <a:spLocks noGrp="1" noRot="1" noChangeAspect="1"/>
-          </p:cNvSpPr>
-          <p:nvPr>
-            <p:ph type="sldImg"/>
-          </p:nvPr>
-        </p:nvSpPr>
-        <p:spPr/>
-      </p:sp>
-      <p:sp>
-        <p:nvSpPr>
-          <p:cNvPr id="3" name="Marcador de Posição de Notas 2"/>
-          <p:cNvSpPr>
-            <a:spLocks noGrp="1"/>
-          </p:cNvSpPr>
-          <p:nvPr>
-            <p:ph type="body" idx="1"/>
-          </p:nvPr>
-        </p:nvSpPr>
-        <p:spPr/>
-        <p:txBody>
-          <a:bodyPr/>
-          <a:lstStyle/>
-          <a:p>
-            <a:r>
-              <a:rPr lang="pt-PT" dirty="0"/>
-              <a:t>GIL</a:t>
-            </a:r>
-          </a:p>
-          <a:p>
-            <a:endParaRPr lang="pt-PT" dirty="0"/>
-          </a:p>
-          <a:p>
-            <a:r>
-              <a:rPr lang="pt-PT" dirty="0"/>
-              <a:t>Ponto 2.1 – falar q </a:t>
-            </a:r>
-            <a:r>
-              <a:rPr lang="pt-PT" dirty="0" err="1"/>
-              <a:t>mongoDB</a:t>
-            </a:r>
-            <a:r>
-              <a:rPr lang="pt-PT" dirty="0"/>
-              <a:t> e parão alteram constantemente conforme regras e conforme vamos querendo eficiência</a:t>
-            </a:r>
-            <a:br>
-              <a:rPr lang="pt-PT" dirty="0"/>
-            </a:br>
-            <a:endParaRPr lang="pt-PT" dirty="0"/>
-          </a:p>
-          <a:p>
-            <a:r>
-              <a:rPr lang="pt-PT" dirty="0"/>
-              <a:t>Ponto 2.2 – dizer q árvore é o q permite escolher diálogo, com base em destreza e tal</a:t>
-            </a:r>
-          </a:p>
-          <a:p>
-            <a:endParaRPr lang="pt-PT" dirty="0"/>
-          </a:p>
-          <a:p>
-            <a:r>
-              <a:rPr lang="pt-PT" dirty="0"/>
-              <a:t>Ponto 2.3 – dizer que é supervisionada para já ?</a:t>
-            </a:r>
-            <a:br>
-              <a:rPr lang="pt-PT" dirty="0"/>
-            </a:br>
-            <a:br>
-              <a:rPr lang="pt-PT" dirty="0"/>
-            </a:br>
-            <a:r>
-              <a:rPr lang="pt-PT" dirty="0"/>
-              <a:t>Ponto 3 – dizer q basicamente temos que melhorar tudo o que temos acima</a:t>
-            </a:r>
-          </a:p>
-        </p:txBody>
-      </p:sp>
-      <p:sp>
-        <p:nvSpPr>
-          <p:cNvPr id="4" name="Marcador de Posição do Número do Diapositivo 3"/>
-          <p:cNvSpPr>
-            <a:spLocks noGrp="1"/>
-          </p:cNvSpPr>
-          <p:nvPr>
-            <p:ph type="sldNum" sz="quarter" idx="5"/>
-          </p:nvPr>
-        </p:nvSpPr>
-        <p:spPr/>
-        <p:txBody>
-          <a:bodyPr/>
-          <a:lstStyle/>
-          <a:p>
-            <a:fld id="{F9C76EEC-3DB8-4814-A8C5-185DA6C5A9E9}" type="slidenum">
-              <a:rPr lang="pt-PT" smtClean="0"/>
-              <a:t>10</a:t>
-            </a:fld>
-            <a:endParaRPr lang="pt-PT"/>
-          </a:p>
-        </p:txBody>
-      </p:sp>
-    </p:spTree>
-    <p:extLst>
-      <p:ext uri="{BB962C8B-B14F-4D97-AF65-F5344CB8AC3E}">
-        <p14:creationId xmlns:p14="http://schemas.microsoft.com/office/powerpoint/2010/main" val="2653281919"/>
-      </p:ext>
-    </p:extLst>
-  </p:cSld>
-  <p:clrMapOvr>
-    <a:masterClrMapping/>
-  </p:clrMapOvr>
-</p:notes>
-</file>
-
-<file path=ppt/notesSlides/notesSlide11.xml><?xml version="1.0" encoding="utf-8"?>
-<p:notes xmlns:a="http://schemas.openxmlformats.org/drawingml/2006/main" xmlns:r="http://schemas.openxmlformats.org/officeDocument/2006/relationships" xmlns:p="http://schemas.openxmlformats.org/presentationml/2006/main">
-  <p:cSld>
-    <p:spTree>
-      <p:nvGrpSpPr>
-        <p:cNvPr id="1" name=""/>
-        <p:cNvGrpSpPr/>
-        <p:nvPr/>
-      </p:nvGrpSpPr>
-      <p:grpSpPr>
-        <a:xfrm>
-          <a:off x="0" y="0"/>
-          <a:ext cx="0" cy="0"/>
-          <a:chOff x="0" y="0"/>
-          <a:chExt cx="0" cy="0"/>
-        </a:xfrm>
-      </p:grpSpPr>
-      <p:sp>
-        <p:nvSpPr>
-          <p:cNvPr id="2" name="Marcador de Posição da Imagem do Diapositivo 1"/>
-          <p:cNvSpPr>
-            <a:spLocks noGrp="1" noRot="1" noChangeAspect="1"/>
-          </p:cNvSpPr>
-          <p:nvPr>
-            <p:ph type="sldImg"/>
-          </p:nvPr>
-        </p:nvSpPr>
-        <p:spPr/>
-      </p:sp>
-      <p:sp>
-        <p:nvSpPr>
-          <p:cNvPr id="3" name="Marcador de Posição de Notas 2"/>
-          <p:cNvSpPr>
-            <a:spLocks noGrp="1"/>
-          </p:cNvSpPr>
-          <p:nvPr>
-            <p:ph type="body" idx="1"/>
-          </p:nvPr>
-        </p:nvSpPr>
-        <p:spPr/>
-        <p:txBody>
-          <a:bodyPr/>
-          <a:lstStyle/>
-          <a:p>
-            <a:r>
-              <a:rPr lang="pt-PT" dirty="0"/>
-              <a:t>GIL</a:t>
-            </a:r>
-          </a:p>
-          <a:p>
-            <a:endParaRPr lang="pt-PT" dirty="0"/>
-          </a:p>
-          <a:p>
-            <a:r>
-              <a:rPr lang="pt-PT" dirty="0"/>
-              <a:t>Ponto 2.1 – falar q </a:t>
-            </a:r>
-            <a:r>
-              <a:rPr lang="pt-PT" dirty="0" err="1"/>
-              <a:t>mongoDB</a:t>
-            </a:r>
-            <a:r>
-              <a:rPr lang="pt-PT" dirty="0"/>
-              <a:t> e parão alteram constantemente conforme regras e conforme vamos querendo eficiência</a:t>
-            </a:r>
-            <a:br>
-              <a:rPr lang="pt-PT" dirty="0"/>
-            </a:br>
-            <a:endParaRPr lang="pt-PT" dirty="0"/>
-          </a:p>
-          <a:p>
-            <a:r>
-              <a:rPr lang="pt-PT" dirty="0"/>
-              <a:t>Ponto 2.2 – dizer q árvore é o q permite escolher diálogo, com base em destreza e tal</a:t>
-            </a:r>
-          </a:p>
-          <a:p>
-            <a:endParaRPr lang="pt-PT" dirty="0"/>
-          </a:p>
-          <a:p>
-            <a:r>
-              <a:rPr lang="pt-PT" dirty="0"/>
-              <a:t>Ponto 2.3 – dizer que é supervisionada para já ?</a:t>
-            </a:r>
-            <a:br>
-              <a:rPr lang="pt-PT" dirty="0"/>
-            </a:br>
-            <a:br>
-              <a:rPr lang="pt-PT" dirty="0"/>
-            </a:br>
-            <a:r>
-              <a:rPr lang="pt-PT" dirty="0"/>
-              <a:t>Ponto 3 – dizer q basicamente temos que melhorar tudo o que temos acima</a:t>
-            </a:r>
-          </a:p>
-        </p:txBody>
-      </p:sp>
-      <p:sp>
-        <p:nvSpPr>
-          <p:cNvPr id="4" name="Marcador de Posição do Número do Diapositivo 3"/>
-          <p:cNvSpPr>
-            <a:spLocks noGrp="1"/>
-          </p:cNvSpPr>
-          <p:nvPr>
-            <p:ph type="sldNum" sz="quarter" idx="5"/>
-          </p:nvPr>
-        </p:nvSpPr>
-        <p:spPr/>
-        <p:txBody>
-          <a:bodyPr/>
-          <a:lstStyle/>
-          <a:p>
-            <a:fld id="{F9C76EEC-3DB8-4814-A8C5-185DA6C5A9E9}" type="slidenum">
-              <a:rPr lang="pt-PT" smtClean="0"/>
-              <a:t>11</a:t>
-            </a:fld>
-            <a:endParaRPr lang="pt-PT"/>
-          </a:p>
-        </p:txBody>
-      </p:sp>
-    </p:spTree>
-    <p:extLst>
-      <p:ext uri="{BB962C8B-B14F-4D97-AF65-F5344CB8AC3E}">
-        <p14:creationId xmlns:p14="http://schemas.microsoft.com/office/powerpoint/2010/main" val="2155469764"/>
-      </p:ext>
-    </p:extLst>
-  </p:cSld>
-  <p:clrMapOvr>
-    <a:masterClrMapping/>
-  </p:clrMapOvr>
-</p:notes>
-</file>
-
-<file path=ppt/notesSlides/notesSlide12.xml><?xml version="1.0" encoding="utf-8"?>
-<p:notes xmlns:a="http://schemas.openxmlformats.org/drawingml/2006/main" xmlns:r="http://schemas.openxmlformats.org/officeDocument/2006/relationships" xmlns:p="http://schemas.openxmlformats.org/presentationml/2006/main">
-  <p:cSld>
-    <p:spTree>
-      <p:nvGrpSpPr>
-        <p:cNvPr id="1" name=""/>
-        <p:cNvGrpSpPr/>
-        <p:nvPr/>
-      </p:nvGrpSpPr>
-      <p:grpSpPr>
-        <a:xfrm>
-          <a:off x="0" y="0"/>
-          <a:ext cx="0" cy="0"/>
-          <a:chOff x="0" y="0"/>
-          <a:chExt cx="0" cy="0"/>
-        </a:xfrm>
-      </p:grpSpPr>
-      <p:sp>
-        <p:nvSpPr>
-          <p:cNvPr id="2" name="Slide Image Placeholder 1"/>
-          <p:cNvSpPr>
-            <a:spLocks noGrp="1" noRot="1" noChangeAspect="1"/>
-          </p:cNvSpPr>
-          <p:nvPr>
-            <p:ph type="sldImg"/>
-          </p:nvPr>
-        </p:nvSpPr>
-        <p:spPr/>
-      </p:sp>
-      <p:sp>
-        <p:nvSpPr>
-          <p:cNvPr id="3" name="Notes Placeholder 2"/>
-          <p:cNvSpPr>
-            <a:spLocks noGrp="1"/>
-          </p:cNvSpPr>
-          <p:nvPr>
-            <p:ph type="body" idx="1"/>
-          </p:nvPr>
-        </p:nvSpPr>
-        <p:spPr/>
-        <p:txBody>
-          <a:bodyPr/>
-          <a:lstStyle/>
-          <a:p>
-            <a:endParaRPr lang="pt-PT" dirty="0"/>
-          </a:p>
-        </p:txBody>
-      </p:sp>
-      <p:sp>
-        <p:nvSpPr>
-          <p:cNvPr id="4" name="Slide Number Placeholder 3"/>
-          <p:cNvSpPr>
-            <a:spLocks noGrp="1"/>
-          </p:cNvSpPr>
-          <p:nvPr>
-            <p:ph type="sldNum" sz="quarter" idx="10"/>
-          </p:nvPr>
-        </p:nvSpPr>
-        <p:spPr/>
-        <p:txBody>
-          <a:bodyPr/>
-          <a:lstStyle/>
-          <a:p>
-            <a:fld id="{F9C76EEC-3DB8-4814-A8C5-185DA6C5A9E9}" type="slidenum">
-              <a:rPr lang="pt-PT" smtClean="0"/>
-              <a:t>12</a:t>
-            </a:fld>
-            <a:endParaRPr lang="pt-PT"/>
-          </a:p>
-        </p:txBody>
-      </p:sp>
-    </p:spTree>
-    <p:extLst>
-      <p:ext uri="{BB962C8B-B14F-4D97-AF65-F5344CB8AC3E}">
-        <p14:creationId xmlns:p14="http://schemas.microsoft.com/office/powerpoint/2010/main" val="2587704403"/>
       </p:ext>
     </p:extLst>
   </p:cSld>
@@ -953,23 +598,6 @@
           <a:bodyPr/>
           <a:lstStyle/>
           <a:p>
-            <a:r>
-              <a:rPr lang="pt-PT" dirty="0"/>
-              <a:t>LUIS</a:t>
-            </a:r>
-          </a:p>
-          <a:p>
-            <a:endParaRPr lang="pt-PT" dirty="0"/>
-          </a:p>
-          <a:p>
-            <a:r>
-              <a:rPr lang="pt-PT" dirty="0"/>
-              <a:t>- Basicamente ler e explicar o </a:t>
-            </a:r>
-            <a:r>
-              <a:rPr lang="pt-PT"/>
-              <a:t>mínimo mesmo (PALHA)</a:t>
-            </a:r>
             <a:endParaRPr lang="pt-PT" dirty="0"/>
           </a:p>
         </p:txBody>
@@ -993,7 +621,7 @@
               <a:rPr lang="pt-PT" smtClean="0"/>
               <a:t>2</a:t>
             </a:fld>
-            <a:endParaRPr lang="pt-PT"/>
+            <a:endParaRPr lang="pt-PT" dirty="0"/>
           </a:p>
         </p:txBody>
       </p:sp>
@@ -1054,76 +682,7 @@
           <a:bodyPr/>
           <a:lstStyle/>
           <a:p>
-            <a:r>
-              <a:rPr lang="pt-PT" dirty="0"/>
-              <a:t>LUIS</a:t>
-            </a:r>
-          </a:p>
-          <a:p>
             <a:endParaRPr lang="pt-PT" dirty="0"/>
-          </a:p>
-          <a:p>
-            <a:r>
-              <a:rPr lang="pt-PT" dirty="0"/>
-              <a:t>Ponto 1 – falar também do exemplo de matemática (geometria, trigonometria,…) para encher</a:t>
-            </a:r>
-          </a:p>
-          <a:p>
-            <a:r>
-              <a:rPr lang="pt-PT" dirty="0"/>
-              <a:t> </a:t>
-            </a:r>
-          </a:p>
-          <a:p>
-            <a:r>
-              <a:rPr lang="pt-PT" dirty="0"/>
-              <a:t>Ponto 2 – 	aluno = utilizador</a:t>
-            </a:r>
-          </a:p>
-          <a:p>
-            <a:r>
-              <a:rPr lang="pt-PT" dirty="0"/>
-              <a:t>     	2.1 Explicar o que é a destreza (media tempo global a responder) e o desempenho(percentagem de respostas certas dentro de todas q já respondeu)</a:t>
-            </a:r>
-          </a:p>
-          <a:p>
-            <a:r>
-              <a:rPr lang="pt-PT" dirty="0"/>
-              <a:t>	2.1 falar do desempenho geral na realização de vários testes, como soma de desempenho de testes individuais</a:t>
-            </a:r>
-            <a:br>
-              <a:rPr lang="pt-PT" dirty="0"/>
-            </a:br>
-            <a:r>
-              <a:rPr lang="pt-PT" dirty="0"/>
-              <a:t>                	2.2 dizer que cada aluno tem sensibilidades diferentes e tal FUTURO, mas para já está adaptado a os dados de cada aluno (performance)</a:t>
-            </a:r>
-            <a:br>
-              <a:rPr lang="pt-PT" dirty="0"/>
-            </a:br>
-            <a:endParaRPr lang="pt-PT" dirty="0"/>
-          </a:p>
-          <a:p>
-            <a:r>
-              <a:rPr lang="pt-PT" dirty="0"/>
-              <a:t>Ponto 3 -  dizer que não se queria apenas o típico </a:t>
-            </a:r>
-            <a:r>
-              <a:rPr lang="pt-PT" dirty="0" err="1"/>
-              <a:t>chatbox</a:t>
-            </a:r>
-            <a:r>
-              <a:rPr lang="pt-PT" dirty="0"/>
-              <a:t> chato, mas um “</a:t>
-            </a:r>
-            <a:r>
-              <a:rPr lang="pt-PT" dirty="0" err="1"/>
-              <a:t>bot</a:t>
-            </a:r>
-            <a:r>
-              <a:rPr lang="pt-PT" dirty="0"/>
-              <a:t>” cativante e adequado a cada aluno</a:t>
-            </a:r>
           </a:p>
         </p:txBody>
       </p:sp>
@@ -1207,29 +766,6 @@
           <a:bodyPr/>
           <a:lstStyle/>
           <a:p>
-            <a:pPr marL="0" marR="0" lvl="0" indent="0" algn="l" defTabSz="914400" rtl="0" eaLnBrk="1" fontAlgn="auto" latinLnBrk="0" hangingPunct="1">
-              <a:lnSpc>
-                <a:spcPct val="100000"/>
-              </a:lnSpc>
-              <a:spcBef>
-                <a:spcPts val="0"/>
-              </a:spcBef>
-              <a:spcAft>
-                <a:spcPts val="0"/>
-              </a:spcAft>
-              <a:buClrTx/>
-              <a:buSzTx/>
-              <a:buFontTx/>
-              <a:buNone/>
-              <a:tabLst/>
-              <a:defRPr/>
-            </a:pPr>
-            <a:r>
-              <a:rPr lang="pt-PT" dirty="0"/>
-              <a:t>LUIS</a:t>
-            </a:r>
-          </a:p>
-          <a:p>
             <a:endParaRPr lang="pt-PT" dirty="0"/>
           </a:p>
         </p:txBody>
@@ -1314,46 +850,7 @@
           <a:bodyPr/>
           <a:lstStyle/>
           <a:p>
-            <a:pPr marL="0" marR="0" lvl="0" indent="0" algn="l" defTabSz="914400" rtl="0" eaLnBrk="1" fontAlgn="auto" latinLnBrk="0" hangingPunct="1">
-              <a:lnSpc>
-                <a:spcPct val="100000"/>
-              </a:lnSpc>
-              <a:spcBef>
-                <a:spcPts val="0"/>
-              </a:spcBef>
-              <a:spcAft>
-                <a:spcPts val="0"/>
-              </a:spcAft>
-              <a:buClrTx/>
-              <a:buSzTx/>
-              <a:buFontTx/>
-              <a:buNone/>
-              <a:tabLst/>
-              <a:defRPr/>
-            </a:pPr>
-            <a:r>
-              <a:rPr lang="pt-PT" dirty="0"/>
-              <a:t>LUIS</a:t>
-            </a:r>
-          </a:p>
-          <a:p>
-            <a:endParaRPr lang="pt-PT" dirty="0"/>
-          </a:p>
-          <a:p>
-            <a:r>
-              <a:rPr lang="pt-PT" dirty="0"/>
-              <a:t>Ponto 1: salientar que a existência dos outros módulos por estarmos a trabalhar em conjunto com outro projeto</a:t>
-            </a:r>
-            <a:br>
-              <a:rPr lang="pt-PT" dirty="0"/>
-            </a:br>
-            <a:br>
-              <a:rPr lang="pt-PT" dirty="0"/>
-            </a:br>
-            <a:r>
-              <a:rPr lang="pt-PT" dirty="0"/>
-              <a:t>Ponto 2: exemplificar domínio e subdomínio</a:t>
-            </a:r>
+            <a:endParaRPr lang="pt-PT" noProof="0" dirty="0"/>
           </a:p>
         </p:txBody>
       </p:sp>
@@ -1383,7 +880,7 @@
     </p:spTree>
     <p:extLst>
       <p:ext uri="{BB962C8B-B14F-4D97-AF65-F5344CB8AC3E}">
-        <p14:creationId xmlns:p14="http://schemas.microsoft.com/office/powerpoint/2010/main" val="1200589705"/>
+        <p14:creationId xmlns:p14="http://schemas.microsoft.com/office/powerpoint/2010/main" val="4054193911"/>
       </p:ext>
     </p:extLst>
   </p:cSld>
@@ -1437,136 +934,6 @@
           <a:bodyPr/>
           <a:lstStyle/>
           <a:p>
-            <a:r>
-              <a:rPr lang="pt-PT" dirty="0"/>
-              <a:t>DIANA</a:t>
-            </a:r>
-          </a:p>
-          <a:p>
-            <a:endParaRPr lang="pt-PT" dirty="0"/>
-          </a:p>
-          <a:p>
-            <a:pPr marL="0" marR="0" lvl="0" indent="0" algn="l" defTabSz="914400" rtl="0" eaLnBrk="1" fontAlgn="auto" latinLnBrk="0" hangingPunct="1">
-              <a:lnSpc>
-                <a:spcPct val="100000"/>
-              </a:lnSpc>
-              <a:spcBef>
-                <a:spcPts val="0"/>
-              </a:spcBef>
-              <a:spcAft>
-                <a:spcPts val="0"/>
-              </a:spcAft>
-              <a:buClrTx/>
-              <a:buSzTx/>
-              <a:buFontTx/>
-              <a:buNone/>
-              <a:tabLst/>
-              <a:defRPr/>
-            </a:pPr>
-            <a:r>
-              <a:rPr lang="pt-PT" dirty="0"/>
-              <a:t>&gt;&gt; apresentação geral das funcionalidades do componente.</a:t>
-            </a:r>
-          </a:p>
-          <a:p>
-            <a:pPr marL="0" marR="0" lvl="0" indent="0" algn="l" defTabSz="914400" rtl="0" eaLnBrk="1" fontAlgn="auto" latinLnBrk="0" hangingPunct="1">
-              <a:lnSpc>
-                <a:spcPct val="100000"/>
-              </a:lnSpc>
-              <a:spcBef>
-                <a:spcPts val="0"/>
-              </a:spcBef>
-              <a:spcAft>
-                <a:spcPts val="0"/>
-              </a:spcAft>
-              <a:buClrTx/>
-              <a:buSzTx/>
-              <a:buFontTx/>
-              <a:buNone/>
-              <a:tabLst/>
-              <a:defRPr/>
-            </a:pPr>
-            <a:endParaRPr lang="pt-PT" dirty="0"/>
-          </a:p>
-          <a:p>
-            <a:pPr marL="0" marR="0" lvl="0" indent="0" algn="l" defTabSz="914400" rtl="0" eaLnBrk="1" fontAlgn="auto" latinLnBrk="0" hangingPunct="1">
-              <a:lnSpc>
-                <a:spcPct val="100000"/>
-              </a:lnSpc>
-              <a:spcBef>
-                <a:spcPts val="0"/>
-              </a:spcBef>
-              <a:spcAft>
-                <a:spcPts val="0"/>
-              </a:spcAft>
-              <a:buClrTx/>
-              <a:buSzTx/>
-              <a:buFontTx/>
-              <a:buNone/>
-              <a:tabLst/>
-              <a:defRPr/>
-            </a:pPr>
-            <a:r>
-              <a:rPr lang="pt-PT" dirty="0"/>
-              <a:t>	COMPONENTE  NOSSA --- ESTÁ INTEGRADA NOUTRAS  como BD &amp; PROFILER</a:t>
-            </a:r>
-            <a:br>
-              <a:rPr lang="pt-PT" dirty="0"/>
-            </a:br>
-            <a:r>
-              <a:rPr lang="pt-PT" dirty="0"/>
-              <a:t>Ponto 1.1 – dizer que vem do </a:t>
-            </a:r>
-            <a:r>
-              <a:rPr lang="pt-PT" dirty="0" err="1"/>
-              <a:t>profiler</a:t>
-            </a:r>
-            <a:r>
-              <a:rPr lang="pt-PT" dirty="0"/>
-              <a:t> (PADRAO em JSON / VETOR DE INFO) –convertemos os valores do padrão noutros valores, segundo os intervalos estabelecidos por</a:t>
-            </a:r>
-            <a:br>
-              <a:rPr lang="pt-PT" dirty="0"/>
-            </a:br>
-            <a:r>
-              <a:rPr lang="pt-PT" dirty="0"/>
-              <a:t>                   nós.</a:t>
-            </a:r>
-          </a:p>
-          <a:p>
-            <a:r>
-              <a:rPr lang="pt-PT" dirty="0"/>
-              <a:t>                –  definir “informação útil” (dados do aluno como performance, se acertou ou errou ultima pergunta,…)</a:t>
-            </a:r>
-          </a:p>
-          <a:p>
-            <a:endParaRPr lang="pt-PT" dirty="0"/>
-          </a:p>
-          <a:p>
-            <a:r>
-              <a:rPr lang="pt-PT" dirty="0"/>
-              <a:t>Ponto 1.2 – explicar que analisamos esses valores e testamos contra as regras estabelecidas por nós, respetivas a cada um dos </a:t>
-            </a:r>
-            <a:r>
-              <a:rPr lang="pt-PT" dirty="0" err="1"/>
-              <a:t>dominios</a:t>
-            </a:r>
-            <a:r>
-              <a:rPr lang="pt-PT" dirty="0"/>
-              <a:t>.</a:t>
-            </a:r>
-          </a:p>
-          <a:p>
-            <a:endParaRPr lang="pt-PT" dirty="0"/>
-          </a:p>
-          <a:p>
-            <a:r>
-              <a:rPr lang="pt-PT" dirty="0"/>
-              <a:t>Ponto 1.3 – dizer que a regra acionada (cujas condições são satisfeitas pelos valores) vai ditar qual o tipo de frase a apresentar ao utilizador</a:t>
-            </a:r>
-            <a:br>
-              <a:rPr lang="pt-PT" dirty="0"/>
-            </a:br>
             <a:endParaRPr lang="pt-PT" dirty="0"/>
           </a:p>
         </p:txBody>
@@ -1597,7 +964,7 @@
     </p:spTree>
     <p:extLst>
       <p:ext uri="{BB962C8B-B14F-4D97-AF65-F5344CB8AC3E}">
-        <p14:creationId xmlns:p14="http://schemas.microsoft.com/office/powerpoint/2010/main" val="1112323880"/>
+        <p14:creationId xmlns:p14="http://schemas.microsoft.com/office/powerpoint/2010/main" val="2653281919"/>
       </p:ext>
     </p:extLst>
   </p:cSld>
@@ -1626,7 +993,7 @@
       </p:grpSpPr>
       <p:sp>
         <p:nvSpPr>
-          <p:cNvPr id="2" name="Marcador de Posição da Imagem do Diapositivo 1"/>
+          <p:cNvPr id="2" name="Slide Image Placeholder 1"/>
           <p:cNvSpPr>
             <a:spLocks noGrp="1" noRot="1" noChangeAspect="1"/>
           </p:cNvSpPr>
@@ -1638,7 +1005,7 @@
       </p:sp>
       <p:sp>
         <p:nvSpPr>
-          <p:cNvPr id="3" name="Marcador de Posição de Notas 2"/>
+          <p:cNvPr id="3" name="Notes Placeholder 2"/>
           <p:cNvSpPr>
             <a:spLocks noGrp="1"/>
           </p:cNvSpPr>
@@ -1651,60 +1018,18 @@
           <a:bodyPr/>
           <a:lstStyle/>
           <a:p>
-            <a:r>
-              <a:rPr lang="pt-PT" dirty="0"/>
-              <a:t>DIANA</a:t>
-            </a:r>
-          </a:p>
-          <a:p>
             <a:endParaRPr lang="pt-PT" dirty="0"/>
           </a:p>
-          <a:p>
-            <a:r>
-              <a:rPr lang="pt-PT" dirty="0"/>
-              <a:t>&gt;&gt; descrição de como o componente atua dentro do sistema global </a:t>
-            </a:r>
-          </a:p>
-          <a:p>
-            <a:r>
-              <a:rPr lang="pt-PT" dirty="0"/>
-              <a:t>---- dizer que não tratamos de ir buscar as perguntas da matéria à BD nem somos o </a:t>
-            </a:r>
-            <a:r>
-              <a:rPr lang="pt-PT" dirty="0" err="1"/>
-              <a:t>profiler</a:t>
-            </a:r>
-            <a:r>
-              <a:rPr lang="pt-PT" dirty="0"/>
-              <a:t>, apenas somos responsáveis pelas frases de diálogo com o aluno</a:t>
-            </a:r>
-          </a:p>
-          <a:p>
-            <a:r>
-              <a:rPr lang="pt-PT" dirty="0"/>
-              <a:t>&gt;&gt; arquitetura básica do componente e sua interação com os outros módulos</a:t>
-            </a:r>
-            <a:br>
-              <a:rPr lang="pt-PT" dirty="0"/>
-            </a:br>
-            <a:r>
-              <a:rPr lang="pt-PT" dirty="0"/>
-              <a:t>---- imagem</a:t>
-            </a:r>
-          </a:p>
-          <a:p>
-            <a:endParaRPr lang="pt-PT" dirty="0"/>
-          </a:p>
-        </p:txBody>
-      </p:sp>
-      <p:sp>
-        <p:nvSpPr>
-          <p:cNvPr id="4" name="Marcador de Posição do Número do Diapositivo 3"/>
-          <p:cNvSpPr>
-            <a:spLocks noGrp="1"/>
-          </p:cNvSpPr>
-          <p:nvPr>
-            <p:ph type="sldNum" sz="quarter" idx="5"/>
+        </p:txBody>
+      </p:sp>
+      <p:sp>
+        <p:nvSpPr>
+          <p:cNvPr id="4" name="Slide Number Placeholder 3"/>
+          <p:cNvSpPr>
+            <a:spLocks noGrp="1"/>
+          </p:cNvSpPr>
+          <p:nvPr>
+            <p:ph type="sldNum" sz="quarter" idx="10"/>
           </p:nvPr>
         </p:nvSpPr>
         <p:spPr/>
@@ -1723,499 +1048,7 @@
     </p:spTree>
     <p:extLst>
       <p:ext uri="{BB962C8B-B14F-4D97-AF65-F5344CB8AC3E}">
-        <p14:creationId xmlns:p14="http://schemas.microsoft.com/office/powerpoint/2010/main" val="3339019805"/>
-      </p:ext>
-    </p:extLst>
-  </p:cSld>
-  <p:clrMapOvr>
-    <a:masterClrMapping/>
-  </p:clrMapOvr>
-</p:notes>
-</file>
-
-<file path=ppt/notesSlides/notesSlide8.xml><?xml version="1.0" encoding="utf-8"?>
-<p:notes xmlns:a="http://schemas.openxmlformats.org/drawingml/2006/main" xmlns:r="http://schemas.openxmlformats.org/officeDocument/2006/relationships" xmlns:p="http://schemas.openxmlformats.org/presentationml/2006/main">
-  <p:cSld>
-    <p:spTree>
-      <p:nvGrpSpPr>
-        <p:cNvPr id="1" name=""/>
-        <p:cNvGrpSpPr/>
-        <p:nvPr/>
-      </p:nvGrpSpPr>
-      <p:grpSpPr>
-        <a:xfrm>
-          <a:off x="0" y="0"/>
-          <a:ext cx="0" cy="0"/>
-          <a:chOff x="0" y="0"/>
-          <a:chExt cx="0" cy="0"/>
-        </a:xfrm>
-      </p:grpSpPr>
-      <p:sp>
-        <p:nvSpPr>
-          <p:cNvPr id="2" name="Marcador de Posição da Imagem do Diapositivo 1"/>
-          <p:cNvSpPr>
-            <a:spLocks noGrp="1" noRot="1" noChangeAspect="1"/>
-          </p:cNvSpPr>
-          <p:nvPr>
-            <p:ph type="sldImg"/>
-          </p:nvPr>
-        </p:nvSpPr>
-        <p:spPr/>
-      </p:sp>
-      <p:sp>
-        <p:nvSpPr>
-          <p:cNvPr id="3" name="Marcador de Posição de Notas 2"/>
-          <p:cNvSpPr>
-            <a:spLocks noGrp="1"/>
-          </p:cNvSpPr>
-          <p:nvPr>
-            <p:ph type="body" idx="1"/>
-          </p:nvPr>
-        </p:nvSpPr>
-        <p:spPr/>
-        <p:txBody>
-          <a:bodyPr/>
-          <a:lstStyle/>
-          <a:p>
-            <a:r>
-              <a:rPr lang="pt-PT" dirty="0"/>
-              <a:t>DIANA</a:t>
-            </a:r>
-          </a:p>
-          <a:p>
-            <a:endParaRPr lang="pt-PT" dirty="0"/>
-          </a:p>
-          <a:p>
-            <a:r>
-              <a:rPr lang="pt-PT" dirty="0"/>
-              <a:t>&gt;&gt; apresentação de um pequeno excerto da base de dados das frases e da sua informação de suporte.</a:t>
-            </a:r>
-          </a:p>
-          <a:p>
-            <a:r>
-              <a:rPr lang="pt-PT" dirty="0"/>
-              <a:t>&gt;&gt; exemplo de um diálogo suportado pelo sistema.</a:t>
-            </a:r>
-          </a:p>
-          <a:p>
-            <a:r>
-              <a:rPr lang="pt-PT" dirty="0"/>
-              <a:t>&gt;&gt; explicar </a:t>
-            </a:r>
-            <a:r>
-              <a:rPr lang="pt-PT" dirty="0" err="1"/>
-              <a:t>tags</a:t>
-            </a:r>
-            <a:r>
-              <a:rPr lang="pt-PT" dirty="0"/>
-              <a:t> (</a:t>
-            </a:r>
-            <a:r>
-              <a:rPr lang="pt-PT" dirty="0" err="1"/>
-              <a:t>greetings</a:t>
-            </a:r>
-            <a:r>
-              <a:rPr lang="pt-PT" dirty="0"/>
-              <a:t>, </a:t>
-            </a:r>
-            <a:r>
-              <a:rPr lang="pt-PT" dirty="0" err="1"/>
-              <a:t>funny</a:t>
-            </a:r>
-            <a:r>
-              <a:rPr lang="pt-PT"/>
-              <a:t> [ESTADOS ESPIRITO LEONARDO], </a:t>
-            </a:r>
-            <a:r>
-              <a:rPr lang="pt-PT" dirty="0" err="1"/>
-              <a:t>phrase</a:t>
-            </a:r>
-            <a:r>
-              <a:rPr lang="pt-PT" dirty="0"/>
-              <a:t>, </a:t>
-            </a:r>
-            <a:r>
-              <a:rPr lang="pt-PT" dirty="0" err="1"/>
-              <a:t>counter</a:t>
-            </a:r>
-            <a:r>
-              <a:rPr lang="pt-PT" dirty="0"/>
-              <a:t>, </a:t>
-            </a:r>
-            <a:r>
-              <a:rPr lang="pt-PT" dirty="0" err="1"/>
-              <a:t>answer</a:t>
-            </a:r>
-            <a:r>
-              <a:rPr lang="pt-PT" dirty="0"/>
-              <a:t>…)</a:t>
-            </a:r>
-          </a:p>
-          <a:p>
-            <a:endParaRPr lang="pt-PT" dirty="0"/>
-          </a:p>
-        </p:txBody>
-      </p:sp>
-      <p:sp>
-        <p:nvSpPr>
-          <p:cNvPr id="4" name="Marcador de Posição do Número do Diapositivo 3"/>
-          <p:cNvSpPr>
-            <a:spLocks noGrp="1"/>
-          </p:cNvSpPr>
-          <p:nvPr>
-            <p:ph type="sldNum" sz="quarter" idx="5"/>
-          </p:nvPr>
-        </p:nvSpPr>
-        <p:spPr/>
-        <p:txBody>
-          <a:bodyPr/>
-          <a:lstStyle/>
-          <a:p>
-            <a:fld id="{F9C76EEC-3DB8-4814-A8C5-185DA6C5A9E9}" type="slidenum">
-              <a:rPr lang="pt-PT" smtClean="0"/>
-              <a:t>8</a:t>
-            </a:fld>
-            <a:endParaRPr lang="pt-PT"/>
-          </a:p>
-        </p:txBody>
-      </p:sp>
-    </p:spTree>
-    <p:extLst>
-      <p:ext uri="{BB962C8B-B14F-4D97-AF65-F5344CB8AC3E}">
-        <p14:creationId xmlns:p14="http://schemas.microsoft.com/office/powerpoint/2010/main" val="2373765445"/>
-      </p:ext>
-    </p:extLst>
-  </p:cSld>
-  <p:clrMapOvr>
-    <a:masterClrMapping/>
-  </p:clrMapOvr>
-</p:notes>
-</file>
-
-<file path=ppt/notesSlides/notesSlide9.xml><?xml version="1.0" encoding="utf-8"?>
-<p:notes xmlns:a="http://schemas.openxmlformats.org/drawingml/2006/main" xmlns:r="http://schemas.openxmlformats.org/officeDocument/2006/relationships" xmlns:p="http://schemas.openxmlformats.org/presentationml/2006/main">
-  <p:cSld>
-    <p:spTree>
-      <p:nvGrpSpPr>
-        <p:cNvPr id="1" name=""/>
-        <p:cNvGrpSpPr/>
-        <p:nvPr/>
-      </p:nvGrpSpPr>
-      <p:grpSpPr>
-        <a:xfrm>
-          <a:off x="0" y="0"/>
-          <a:ext cx="0" cy="0"/>
-          <a:chOff x="0" y="0"/>
-          <a:chExt cx="0" cy="0"/>
-        </a:xfrm>
-      </p:grpSpPr>
-      <p:sp>
-        <p:nvSpPr>
-          <p:cNvPr id="2" name="Marcador de Posição da Imagem do Diapositivo 1"/>
-          <p:cNvSpPr>
-            <a:spLocks noGrp="1" noRot="1" noChangeAspect="1"/>
-          </p:cNvSpPr>
-          <p:nvPr>
-            <p:ph type="sldImg"/>
-          </p:nvPr>
-        </p:nvSpPr>
-        <p:spPr/>
-      </p:sp>
-      <p:sp>
-        <p:nvSpPr>
-          <p:cNvPr id="3" name="Marcador de Posição de Notas 2"/>
-          <p:cNvSpPr>
-            <a:spLocks noGrp="1"/>
-          </p:cNvSpPr>
-          <p:nvPr>
-            <p:ph type="body" idx="1"/>
-          </p:nvPr>
-        </p:nvSpPr>
-        <p:spPr/>
-        <p:txBody>
-          <a:bodyPr/>
-          <a:lstStyle/>
-          <a:p>
-            <a:r>
-              <a:rPr lang="pt-PT" dirty="0"/>
-              <a:t>GIL</a:t>
-            </a:r>
-          </a:p>
-          <a:p>
-            <a:endParaRPr lang="pt-PT" dirty="0"/>
-          </a:p>
-          <a:p>
-            <a:r>
-              <a:rPr lang="pt-PT" dirty="0"/>
-              <a:t>- No </a:t>
-            </a:r>
-            <a:r>
-              <a:rPr lang="pt-PT" dirty="0" err="1"/>
-              <a:t>python</a:t>
-            </a:r>
-            <a:r>
-              <a:rPr lang="pt-PT" dirty="0"/>
-              <a:t> falar do script para geração de frases, com cadeias de </a:t>
-            </a:r>
-            <a:r>
-              <a:rPr lang="pt-PT" dirty="0" err="1"/>
-              <a:t>Markov</a:t>
-            </a:r>
-            <a:r>
-              <a:rPr lang="pt-PT" dirty="0"/>
-              <a:t> e utilização de NLTK para processamento de frases (separar por palavras)</a:t>
-            </a:r>
-          </a:p>
-          <a:p>
-            <a:pPr marL="171450" indent="-171450">
-              <a:buFontTx/>
-              <a:buChar char="-"/>
-            </a:pPr>
-            <a:r>
-              <a:rPr lang="pt-PT" dirty="0" err="1"/>
-              <a:t>Sentence</a:t>
-            </a:r>
-            <a:r>
-              <a:rPr lang="pt-PT" dirty="0"/>
-              <a:t> </a:t>
-            </a:r>
-            <a:r>
-              <a:rPr lang="pt-PT" dirty="0" err="1"/>
-              <a:t>generator</a:t>
-            </a:r>
-            <a:r>
-              <a:rPr lang="pt-PT" dirty="0"/>
-              <a:t> </a:t>
-            </a:r>
-            <a:r>
-              <a:rPr lang="pt-PT" dirty="0" err="1"/>
-              <a:t>with</a:t>
-            </a:r>
-            <a:r>
-              <a:rPr lang="pt-PT" dirty="0"/>
-              <a:t> </a:t>
-            </a:r>
-            <a:r>
-              <a:rPr lang="pt-PT" dirty="0" err="1"/>
-              <a:t>Markov</a:t>
-            </a:r>
-            <a:r>
-              <a:rPr lang="pt-PT" dirty="0"/>
-              <a:t> </a:t>
-            </a:r>
-            <a:r>
-              <a:rPr lang="pt-PT" dirty="0" err="1"/>
-              <a:t>chains</a:t>
-            </a:r>
-            <a:r>
-              <a:rPr lang="pt-PT" dirty="0"/>
-              <a:t>: o programa </a:t>
-            </a:r>
-            <a:r>
-              <a:rPr lang="pt-PT" sz="1200" b="0" i="0" kern="1200" dirty="0">
-                <a:solidFill>
-                  <a:schemeClr val="tx1"/>
-                </a:solidFill>
-                <a:effectLst/>
-                <a:latin typeface="+mn-lt"/>
-                <a:ea typeface="+mn-ea"/>
-                <a:cs typeface="+mn-cs"/>
-              </a:rPr>
-              <a:t>cria um dicionário com as palavras, recebidas de um </a:t>
-            </a:r>
-            <a:r>
-              <a:rPr lang="pt-PT" sz="1200" b="0" i="0" kern="1200" dirty="0" err="1">
-                <a:solidFill>
-                  <a:schemeClr val="tx1"/>
-                </a:solidFill>
-                <a:effectLst/>
-                <a:latin typeface="+mn-lt"/>
-                <a:ea typeface="+mn-ea"/>
-                <a:cs typeface="+mn-cs"/>
-              </a:rPr>
-              <a:t>dataset</a:t>
-            </a:r>
-            <a:r>
-              <a:rPr lang="pt-PT" sz="1200" b="0" i="0" kern="1200" dirty="0">
-                <a:solidFill>
-                  <a:schemeClr val="tx1"/>
-                </a:solidFill>
-                <a:effectLst/>
-                <a:latin typeface="+mn-lt"/>
-                <a:ea typeface="+mn-ea"/>
-                <a:cs typeface="+mn-cs"/>
-              </a:rPr>
-              <a:t> com frases, e a palavra que vem a seguir, e depois aplica cadeias de </a:t>
-            </a:r>
-            <a:r>
-              <a:rPr lang="pt-PT" sz="1200" b="0" i="0" kern="1200" dirty="0" err="1">
-                <a:solidFill>
-                  <a:schemeClr val="tx1"/>
-                </a:solidFill>
-                <a:effectLst/>
-                <a:latin typeface="+mn-lt"/>
-                <a:ea typeface="+mn-ea"/>
-                <a:cs typeface="+mn-cs"/>
-              </a:rPr>
-              <a:t>Markov</a:t>
-            </a:r>
-            <a:r>
-              <a:rPr lang="pt-PT" sz="1200" b="0" i="0" kern="1200" dirty="0">
-                <a:solidFill>
-                  <a:schemeClr val="tx1"/>
-                </a:solidFill>
-                <a:effectLst/>
-                <a:latin typeface="+mn-lt"/>
-                <a:ea typeface="+mn-ea"/>
-                <a:cs typeface="+mn-cs"/>
-              </a:rPr>
-              <a:t> sobre essa informação tentando fazer frases que fazem sentido. As cadeias de </a:t>
-            </a:r>
-            <a:r>
-              <a:rPr lang="pt-PT" sz="1200" b="0" i="0" kern="1200" dirty="0" err="1">
-                <a:solidFill>
-                  <a:schemeClr val="tx1"/>
-                </a:solidFill>
-                <a:effectLst/>
-                <a:latin typeface="+mn-lt"/>
-                <a:ea typeface="+mn-ea"/>
-                <a:cs typeface="+mn-cs"/>
-              </a:rPr>
-              <a:t>Markov</a:t>
-            </a:r>
-            <a:r>
-              <a:rPr lang="pt-PT" sz="1200" b="0" i="0" kern="1200" dirty="0">
-                <a:solidFill>
-                  <a:schemeClr val="tx1"/>
-                </a:solidFill>
-                <a:effectLst/>
-                <a:latin typeface="+mn-lt"/>
-                <a:ea typeface="+mn-ea"/>
-                <a:cs typeface="+mn-cs"/>
-              </a:rPr>
-              <a:t> são uteis para prever o estado futuro com base nas características do estado presente. Assim , o programa utiliza e analisa as frases de um </a:t>
-            </a:r>
-            <a:r>
-              <a:rPr lang="pt-PT" sz="1200" b="0" i="0" kern="1200" dirty="0" err="1">
-                <a:solidFill>
-                  <a:schemeClr val="tx1"/>
-                </a:solidFill>
-                <a:effectLst/>
-                <a:latin typeface="+mn-lt"/>
-                <a:ea typeface="+mn-ea"/>
-                <a:cs typeface="+mn-cs"/>
-              </a:rPr>
-              <a:t>dataset</a:t>
-            </a:r>
-            <a:r>
-              <a:rPr lang="pt-PT" sz="1200" b="0" i="0" kern="1200" dirty="0">
-                <a:solidFill>
-                  <a:schemeClr val="tx1"/>
-                </a:solidFill>
-                <a:effectLst/>
-                <a:latin typeface="+mn-lt"/>
-                <a:ea typeface="+mn-ea"/>
-                <a:cs typeface="+mn-cs"/>
-              </a:rPr>
-              <a:t> inicial e, a partir dai, tenta prever e gerar novas frases. Utiliza as cadeiras de </a:t>
-            </a:r>
-            <a:r>
-              <a:rPr lang="pt-PT" sz="1200" b="0" i="0" kern="1200" dirty="0" err="1">
-                <a:solidFill>
-                  <a:schemeClr val="tx1"/>
-                </a:solidFill>
-                <a:effectLst/>
-                <a:latin typeface="+mn-lt"/>
-                <a:ea typeface="+mn-ea"/>
-                <a:cs typeface="+mn-cs"/>
-              </a:rPr>
-              <a:t>markov</a:t>
-            </a:r>
-            <a:r>
-              <a:rPr lang="pt-PT" sz="1200" b="0" i="0" kern="1200" dirty="0">
-                <a:solidFill>
-                  <a:schemeClr val="tx1"/>
-                </a:solidFill>
-                <a:effectLst/>
-                <a:latin typeface="+mn-lt"/>
-                <a:ea typeface="+mn-ea"/>
-                <a:cs typeface="+mn-cs"/>
-              </a:rPr>
-              <a:t> para prever quais as sequências de palavras mais adequadas que precedem a um outro conjunto de palavras.</a:t>
-            </a:r>
-          </a:p>
-          <a:p>
-            <a:pPr marL="171450" indent="-171450">
-              <a:buFontTx/>
-              <a:buChar char="-"/>
-            </a:pPr>
-            <a:r>
-              <a:rPr lang="pt-PT" sz="1200" b="0" i="0" kern="1200" dirty="0">
-                <a:solidFill>
-                  <a:schemeClr val="tx1"/>
-                </a:solidFill>
-                <a:effectLst/>
-                <a:latin typeface="+mn-lt"/>
-                <a:ea typeface="+mn-ea"/>
-                <a:cs typeface="+mn-cs"/>
-              </a:rPr>
-              <a:t>Cadeias de </a:t>
-            </a:r>
-            <a:r>
-              <a:rPr lang="pt-PT" sz="1200" b="0" i="0" kern="1200" dirty="0" err="1">
-                <a:solidFill>
-                  <a:schemeClr val="tx1"/>
-                </a:solidFill>
-                <a:effectLst/>
-                <a:latin typeface="+mn-lt"/>
-                <a:ea typeface="+mn-ea"/>
-                <a:cs typeface="+mn-cs"/>
-              </a:rPr>
-              <a:t>Markov</a:t>
-            </a:r>
-            <a:r>
-              <a:rPr lang="pt-PT" sz="1200" b="0" i="0" kern="1200" dirty="0">
-                <a:solidFill>
-                  <a:schemeClr val="tx1"/>
-                </a:solidFill>
-                <a:effectLst/>
-                <a:latin typeface="+mn-lt"/>
-                <a:ea typeface="+mn-ea"/>
-                <a:cs typeface="+mn-cs"/>
-              </a:rPr>
-              <a:t> são, por isso, bastante utilizadas neste tipo de situações!</a:t>
-            </a:r>
-            <a:endParaRPr lang="pt-PT" dirty="0"/>
-          </a:p>
-        </p:txBody>
-      </p:sp>
-      <p:sp>
-        <p:nvSpPr>
-          <p:cNvPr id="4" name="Marcador de Posição do Número do Diapositivo 3"/>
-          <p:cNvSpPr>
-            <a:spLocks noGrp="1"/>
-          </p:cNvSpPr>
-          <p:nvPr>
-            <p:ph type="sldNum" sz="quarter" idx="5"/>
-          </p:nvPr>
-        </p:nvSpPr>
-        <p:spPr/>
-        <p:txBody>
-          <a:bodyPr/>
-          <a:lstStyle/>
-          <a:p>
-            <a:fld id="{F9C76EEC-3DB8-4814-A8C5-185DA6C5A9E9}" type="slidenum">
-              <a:rPr lang="pt-PT" smtClean="0"/>
-              <a:t>9</a:t>
-            </a:fld>
-            <a:endParaRPr lang="pt-PT"/>
-          </a:p>
-        </p:txBody>
-      </p:sp>
-    </p:spTree>
-    <p:extLst>
-      <p:ext uri="{BB962C8B-B14F-4D97-AF65-F5344CB8AC3E}">
-        <p14:creationId xmlns:p14="http://schemas.microsoft.com/office/powerpoint/2010/main" val="3154484066"/>
+        <p14:creationId xmlns:p14="http://schemas.microsoft.com/office/powerpoint/2010/main" val="2587704403"/>
       </p:ext>
     </p:extLst>
   </p:cSld>
@@ -2451,7 +1284,7 @@
           <a:p>
             <a:fld id="{D3D2C362-FAA5-4C55-BE02-652F59C753E4}" type="datetimeFigureOut">
               <a:rPr lang="pt-PT" smtClean="0"/>
-              <a:t>27/03/2019</a:t>
+              <a:t>27/05/2019</a:t>
             </a:fld>
             <a:endParaRPr lang="pt-PT"/>
           </a:p>
@@ -2659,7 +1492,7 @@
           <a:p>
             <a:fld id="{D3D2C362-FAA5-4C55-BE02-652F59C753E4}" type="datetimeFigureOut">
               <a:rPr lang="pt-PT" smtClean="0"/>
-              <a:t>27/03/2019</a:t>
+              <a:t>27/05/2019</a:t>
             </a:fld>
             <a:endParaRPr lang="pt-PT"/>
           </a:p>
@@ -2915,7 +1748,7 @@
           <a:p>
             <a:fld id="{D3D2C362-FAA5-4C55-BE02-652F59C753E4}" type="datetimeFigureOut">
               <a:rPr lang="pt-PT" smtClean="0"/>
-              <a:t>27/03/2019</a:t>
+              <a:t>27/05/2019</a:t>
             </a:fld>
             <a:endParaRPr lang="pt-PT"/>
           </a:p>
@@ -3089,7 +1922,7 @@
           <a:p>
             <a:fld id="{D3D2C362-FAA5-4C55-BE02-652F59C753E4}" type="datetimeFigureOut">
               <a:rPr lang="pt-PT" smtClean="0"/>
-              <a:t>27/03/2019</a:t>
+              <a:t>27/05/2019</a:t>
             </a:fld>
             <a:endParaRPr lang="pt-PT"/>
           </a:p>
@@ -3432,7 +2265,7 @@
           <a:p>
             <a:fld id="{D3D2C362-FAA5-4C55-BE02-652F59C753E4}" type="datetimeFigureOut">
               <a:rPr lang="pt-PT" smtClean="0"/>
-              <a:t>27/03/2019</a:t>
+              <a:t>27/05/2019</a:t>
             </a:fld>
             <a:endParaRPr lang="pt-PT"/>
           </a:p>
@@ -3707,7 +2540,7 @@
           <a:p>
             <a:fld id="{D3D2C362-FAA5-4C55-BE02-652F59C753E4}" type="datetimeFigureOut">
               <a:rPr lang="pt-PT" smtClean="0"/>
-              <a:t>27/03/2019</a:t>
+              <a:t>27/05/2019</a:t>
             </a:fld>
             <a:endParaRPr lang="pt-PT"/>
           </a:p>
@@ -4086,7 +2919,7 @@
           <a:p>
             <a:fld id="{D3D2C362-FAA5-4C55-BE02-652F59C753E4}" type="datetimeFigureOut">
               <a:rPr lang="pt-PT" smtClean="0"/>
-              <a:t>27/03/2019</a:t>
+              <a:t>27/05/2019</a:t>
             </a:fld>
             <a:endParaRPr lang="pt-PT"/>
           </a:p>
@@ -4204,7 +3037,7 @@
           <a:p>
             <a:fld id="{D3D2C362-FAA5-4C55-BE02-652F59C753E4}" type="datetimeFigureOut">
               <a:rPr lang="pt-PT" smtClean="0"/>
-              <a:t>27/03/2019</a:t>
+              <a:t>27/05/2019</a:t>
             </a:fld>
             <a:endParaRPr lang="pt-PT"/>
           </a:p>
@@ -4375,7 +3208,7 @@
           <a:p>
             <a:fld id="{D3D2C362-FAA5-4C55-BE02-652F59C753E4}" type="datetimeFigureOut">
               <a:rPr lang="pt-PT" smtClean="0"/>
-              <a:t>27/03/2019</a:t>
+              <a:t>27/05/2019</a:t>
             </a:fld>
             <a:endParaRPr lang="pt-PT"/>
           </a:p>
@@ -4729,7 +3562,7 @@
           <a:p>
             <a:fld id="{D3D2C362-FAA5-4C55-BE02-652F59C753E4}" type="datetimeFigureOut">
               <a:rPr lang="pt-PT" smtClean="0"/>
-              <a:t>27/03/2019</a:t>
+              <a:t>27/05/2019</a:t>
             </a:fld>
             <a:endParaRPr lang="pt-PT"/>
           </a:p>
@@ -5111,7 +3944,7 @@
           <a:p>
             <a:fld id="{D3D2C362-FAA5-4C55-BE02-652F59C753E4}" type="datetimeFigureOut">
               <a:rPr lang="pt-PT" smtClean="0"/>
-              <a:t>27/03/2019</a:t>
+              <a:t>27/05/2019</a:t>
             </a:fld>
             <a:endParaRPr lang="pt-PT"/>
           </a:p>
@@ -5398,7 +4231,7 @@
           <a:p>
             <a:fld id="{D3D2C362-FAA5-4C55-BE02-652F59C753E4}" type="datetimeFigureOut">
               <a:rPr lang="pt-PT" smtClean="0"/>
-              <a:t>27/03/2019</a:t>
+              <a:t>27/05/2019</a:t>
             </a:fld>
             <a:endParaRPr lang="pt-PT"/>
           </a:p>
@@ -6202,7 +5035,7 @@
 </p:sld>
 </file>
 
-<file path=ppt/slides/slide10.xml><?xml version="1.0" encoding="utf-8"?>
+<file path=ppt/slides/slide2.xml><?xml version="1.0" encoding="utf-8"?>
 <p:sld xmlns:a="http://schemas.openxmlformats.org/drawingml/2006/main" xmlns:r="http://schemas.openxmlformats.org/officeDocument/2006/relationships" xmlns:p="http://schemas.openxmlformats.org/presentationml/2006/main">
   <p:cSld>
     <p:spTree>
@@ -6224,7 +5057,7 @@
           <p:cNvPr id="2" name="Título 1">
             <a:extLst>
               <a:ext uri="{FF2B5EF4-FFF2-40B4-BE49-F238E27FC236}">
-                <a16:creationId xmlns:a16="http://schemas.microsoft.com/office/drawing/2014/main" id="{E7F3627F-344B-4BBB-AE8A-D976F33B76F1}"/>
+                <a16:creationId xmlns:a16="http://schemas.microsoft.com/office/drawing/2014/main" id="{5C20F771-AF31-4EEC-ABD2-41F5084655DE}"/>
               </a:ext>
             </a:extLst>
           </p:cNvPr>
@@ -6248,7 +5081,850 @@
                   </a:schemeClr>
                 </a:solidFill>
               </a:rPr>
-              <a:t>Conclusões</a:t>
+              <a:t>Estrutura da Apresentação</a:t>
+            </a:r>
+          </a:p>
+        </p:txBody>
+      </p:sp>
+      <p:sp>
+        <p:nvSpPr>
+          <p:cNvPr id="3" name="Marcador de Posição de Conteúdo 2">
+            <a:extLst>
+              <a:ext uri="{FF2B5EF4-FFF2-40B4-BE49-F238E27FC236}">
+                <a16:creationId xmlns:a16="http://schemas.microsoft.com/office/drawing/2014/main" id="{31943E7B-9CF1-4EA1-9275-257EF8B743C1}"/>
+              </a:ext>
+            </a:extLst>
+          </p:cNvPr>
+          <p:cNvSpPr>
+            <a:spLocks noGrp="1"/>
+          </p:cNvSpPr>
+          <p:nvPr>
+            <p:ph idx="1"/>
+          </p:nvPr>
+        </p:nvSpPr>
+        <p:spPr>
+          <a:xfrm>
+            <a:off x="1097280" y="1930884"/>
+            <a:ext cx="10058400" cy="4023360"/>
+          </a:xfrm>
+        </p:spPr>
+        <p:txBody>
+          <a:bodyPr/>
+          <a:lstStyle/>
+          <a:p>
+            <a:pPr>
+              <a:buFont typeface="Wingdings" panose="05000000000000000000" pitchFamily="2" charset="2"/>
+              <a:buChar char="q"/>
+            </a:pPr>
+            <a:r>
+              <a:rPr lang="pt-PT" dirty="0"/>
+              <a:t> Contextualização</a:t>
+            </a:r>
+          </a:p>
+          <a:p>
+            <a:pPr>
+              <a:buFont typeface="Wingdings" panose="05000000000000000000" pitchFamily="2" charset="2"/>
+              <a:buChar char="q"/>
+            </a:pPr>
+            <a:r>
+              <a:rPr lang="pt-PT" dirty="0"/>
+              <a:t> Motivação e Objetivos </a:t>
+            </a:r>
+          </a:p>
+          <a:p>
+            <a:pPr>
+              <a:buFont typeface="Wingdings" panose="05000000000000000000" pitchFamily="2" charset="2"/>
+              <a:buChar char="q"/>
+            </a:pPr>
+            <a:r>
+              <a:rPr lang="pt-PT" dirty="0"/>
+              <a:t> Trabalhos Relacionados</a:t>
+            </a:r>
+          </a:p>
+          <a:p>
+            <a:pPr>
+              <a:buFont typeface="Wingdings" panose="05000000000000000000" pitchFamily="2" charset="2"/>
+              <a:buChar char="q"/>
+            </a:pPr>
+            <a:r>
+              <a:rPr lang="pt-PT" dirty="0"/>
+              <a:t> Conceção e Implementação do Sistema</a:t>
+            </a:r>
+          </a:p>
+          <a:p>
+            <a:pPr>
+              <a:buFont typeface="Wingdings" panose="05000000000000000000" pitchFamily="2" charset="2"/>
+              <a:buChar char="q"/>
+            </a:pPr>
+            <a:r>
+              <a:rPr lang="pt-PT" dirty="0"/>
+              <a:t> Recursos Computacionais</a:t>
+            </a:r>
+          </a:p>
+          <a:p>
+            <a:pPr>
+              <a:buFont typeface="Wingdings" panose="05000000000000000000" pitchFamily="2" charset="2"/>
+              <a:buChar char="q"/>
+            </a:pPr>
+            <a:r>
+              <a:rPr lang="pt-PT" dirty="0"/>
+              <a:t> Instalação e Configuração</a:t>
+            </a:r>
+          </a:p>
+          <a:p>
+            <a:pPr>
+              <a:buFont typeface="Wingdings" panose="05000000000000000000" pitchFamily="2" charset="2"/>
+              <a:buChar char="q"/>
+            </a:pPr>
+            <a:r>
+              <a:rPr lang="pt-PT" dirty="0"/>
+              <a:t> Funcionamento do Sistema</a:t>
+            </a:r>
+          </a:p>
+          <a:p>
+            <a:pPr>
+              <a:buFont typeface="Wingdings" panose="05000000000000000000" pitchFamily="2" charset="2"/>
+              <a:buChar char="q"/>
+            </a:pPr>
+            <a:r>
+              <a:rPr lang="pt-PT" dirty="0"/>
+              <a:t> Conclusões e Trabalho Futuro</a:t>
+            </a:r>
+          </a:p>
+        </p:txBody>
+      </p:sp>
+    </p:spTree>
+    <p:extLst>
+      <p:ext uri="{BB962C8B-B14F-4D97-AF65-F5344CB8AC3E}">
+        <p14:creationId xmlns:p14="http://schemas.microsoft.com/office/powerpoint/2010/main" val="1453793189"/>
+      </p:ext>
+    </p:extLst>
+  </p:cSld>
+  <p:clrMapOvr>
+    <a:masterClrMapping/>
+  </p:clrMapOvr>
+  <p:transition spd="slow">
+    <p:cover/>
+  </p:transition>
+</p:sld>
+</file>
+
+<file path=ppt/slides/slide3.xml><?xml version="1.0" encoding="utf-8"?>
+<p:sld xmlns:a="http://schemas.openxmlformats.org/drawingml/2006/main" xmlns:r="http://schemas.openxmlformats.org/officeDocument/2006/relationships" xmlns:p="http://schemas.openxmlformats.org/presentationml/2006/main">
+  <p:cSld>
+    <p:spTree>
+      <p:nvGrpSpPr>
+        <p:cNvPr id="1" name=""/>
+        <p:cNvGrpSpPr/>
+        <p:nvPr/>
+      </p:nvGrpSpPr>
+      <p:grpSpPr>
+        <a:xfrm>
+          <a:off x="0" y="0"/>
+          <a:ext cx="0" cy="0"/>
+          <a:chOff x="0" y="0"/>
+          <a:chExt cx="0" cy="0"/>
+        </a:xfrm>
+      </p:grpSpPr>
+      <p:sp>
+        <p:nvSpPr>
+          <p:cNvPr id="2" name="Título 1">
+            <a:extLst>
+              <a:ext uri="{FF2B5EF4-FFF2-40B4-BE49-F238E27FC236}">
+                <a16:creationId xmlns:a16="http://schemas.microsoft.com/office/drawing/2014/main" id="{9DA54CA6-DF71-42B3-BA6C-A5070B9A6FCF}"/>
+              </a:ext>
+            </a:extLst>
+          </p:cNvPr>
+          <p:cNvSpPr>
+            <a:spLocks noGrp="1"/>
+          </p:cNvSpPr>
+          <p:nvPr>
+            <p:ph type="title"/>
+          </p:nvPr>
+        </p:nvSpPr>
+        <p:spPr/>
+        <p:txBody>
+          <a:bodyPr/>
+          <a:lstStyle/>
+          <a:p>
+            <a:r>
+              <a:rPr lang="pt-PT" dirty="0">
+                <a:solidFill>
+                  <a:schemeClr val="bg1">
+                    <a:lumMod val="50000"/>
+                  </a:schemeClr>
+                </a:solidFill>
+              </a:rPr>
+              <a:t>Contextualização</a:t>
+            </a:r>
+          </a:p>
+        </p:txBody>
+      </p:sp>
+      <p:sp>
+        <p:nvSpPr>
+          <p:cNvPr id="3" name="Marcador de Posição de Conteúdo 2">
+            <a:extLst>
+              <a:ext uri="{FF2B5EF4-FFF2-40B4-BE49-F238E27FC236}">
+                <a16:creationId xmlns:a16="http://schemas.microsoft.com/office/drawing/2014/main" id="{9AC072B4-F76D-46EF-9BF9-52FD93046E58}"/>
+              </a:ext>
+            </a:extLst>
+          </p:cNvPr>
+          <p:cNvSpPr>
+            <a:spLocks noGrp="1"/>
+          </p:cNvSpPr>
+          <p:nvPr>
+            <p:ph idx="1"/>
+          </p:nvPr>
+        </p:nvSpPr>
+        <p:spPr>
+          <a:xfrm>
+            <a:off x="1097280" y="1930401"/>
+            <a:ext cx="10058400" cy="4023360"/>
+          </a:xfrm>
+        </p:spPr>
+        <p:txBody>
+          <a:bodyPr/>
+          <a:lstStyle/>
+          <a:p>
+            <a:pPr>
+              <a:buFont typeface="Wingdings" panose="05000000000000000000" pitchFamily="2" charset="2"/>
+              <a:buChar char="q"/>
+            </a:pPr>
+            <a:r>
+              <a:rPr lang="pt-PT" dirty="0"/>
+              <a:t> Projeto “Leonardo” surge como um sistema de avaliação de determinadas </a:t>
+            </a:r>
+            <a:r>
+              <a:rPr lang="pt-PT" dirty="0" err="1"/>
+              <a:t>UCs</a:t>
+            </a:r>
+            <a:r>
+              <a:rPr lang="pt-PT" dirty="0"/>
+              <a:t>:</a:t>
+            </a:r>
+          </a:p>
+          <a:p>
+            <a:pPr lvl="1">
+              <a:buFont typeface="Wingdings" panose="05000000000000000000" pitchFamily="2" charset="2"/>
+              <a:buChar char="q"/>
+            </a:pPr>
+            <a:r>
+              <a:rPr lang="pt-PT" dirty="0"/>
+              <a:t> Bases de Dados</a:t>
+            </a:r>
+          </a:p>
+          <a:p>
+            <a:pPr lvl="2">
+              <a:buFont typeface="Wingdings" panose="05000000000000000000" pitchFamily="2" charset="2"/>
+              <a:buChar char="q"/>
+            </a:pPr>
+            <a:r>
+              <a:rPr lang="pt-PT" dirty="0"/>
+              <a:t> Álgebra Relacional</a:t>
+            </a:r>
+          </a:p>
+          <a:p>
+            <a:pPr lvl="2">
+              <a:buFont typeface="Wingdings" panose="05000000000000000000" pitchFamily="2" charset="2"/>
+              <a:buChar char="q"/>
+            </a:pPr>
+            <a:r>
+              <a:rPr lang="pt-PT" dirty="0"/>
+              <a:t> Modelo Conceptual </a:t>
+            </a:r>
+          </a:p>
+          <a:p>
+            <a:pPr lvl="2">
+              <a:buFont typeface="Wingdings" panose="05000000000000000000" pitchFamily="2" charset="2"/>
+              <a:buChar char="q"/>
+            </a:pPr>
+            <a:r>
+              <a:rPr lang="pt-PT" dirty="0"/>
+              <a:t> Modelo Lógico</a:t>
+            </a:r>
+          </a:p>
+          <a:p>
+            <a:pPr lvl="2">
+              <a:buFont typeface="Wingdings" panose="05000000000000000000" pitchFamily="2" charset="2"/>
+              <a:buChar char="q"/>
+            </a:pPr>
+            <a:r>
+              <a:rPr lang="pt-PT" dirty="0"/>
+              <a:t>…</a:t>
+            </a:r>
+          </a:p>
+          <a:p>
+            <a:pPr>
+              <a:buFont typeface="Wingdings" panose="05000000000000000000" pitchFamily="2" charset="2"/>
+              <a:buChar char="q"/>
+            </a:pPr>
+            <a:r>
+              <a:rPr lang="pt-PT" dirty="0"/>
+              <a:t> Cada aluno tem um perfil</a:t>
+            </a:r>
+            <a:r>
+              <a:rPr lang="pt-PT" i="1" dirty="0"/>
+              <a:t>: </a:t>
+            </a:r>
+          </a:p>
+          <a:p>
+            <a:pPr lvl="1">
+              <a:buFont typeface="Wingdings" panose="05000000000000000000" pitchFamily="2" charset="2"/>
+              <a:buChar char="q"/>
+            </a:pPr>
+            <a:r>
+              <a:rPr lang="pt-PT" i="1" dirty="0"/>
+              <a:t> </a:t>
+            </a:r>
+            <a:r>
+              <a:rPr lang="pt-PT" dirty="0"/>
+              <a:t>Diferentes desempenhos e destrezas em vários temas avaliados;</a:t>
+            </a:r>
+          </a:p>
+          <a:p>
+            <a:pPr lvl="1">
+              <a:buFont typeface="Wingdings" panose="05000000000000000000" pitchFamily="2" charset="2"/>
+              <a:buChar char="q"/>
+            </a:pPr>
+            <a:r>
+              <a:rPr lang="pt-PT" dirty="0"/>
+              <a:t> Última vez que fez log in;</a:t>
+            </a:r>
+          </a:p>
+          <a:p>
+            <a:pPr>
+              <a:buFont typeface="Wingdings" panose="05000000000000000000" pitchFamily="2" charset="2"/>
+              <a:buChar char="q"/>
+            </a:pPr>
+            <a:r>
+              <a:rPr lang="pt-PT" dirty="0"/>
+              <a:t> Desenvolvimento de um gestor de diálogos como personificação do Leonardo.</a:t>
+            </a:r>
+          </a:p>
+          <a:p>
+            <a:endParaRPr lang="pt-PT" dirty="0"/>
+          </a:p>
+          <a:p>
+            <a:endParaRPr lang="pt-PT" dirty="0"/>
+          </a:p>
+        </p:txBody>
+      </p:sp>
+    </p:spTree>
+    <p:extLst>
+      <p:ext uri="{BB962C8B-B14F-4D97-AF65-F5344CB8AC3E}">
+        <p14:creationId xmlns:p14="http://schemas.microsoft.com/office/powerpoint/2010/main" val="3413792368"/>
+      </p:ext>
+    </p:extLst>
+  </p:cSld>
+  <p:clrMapOvr>
+    <a:masterClrMapping/>
+  </p:clrMapOvr>
+  <p:transition spd="slow">
+    <p:cover/>
+  </p:transition>
+</p:sld>
+</file>
+
+<file path=ppt/slides/slide4.xml><?xml version="1.0" encoding="utf-8"?>
+<p:sld xmlns:a="http://schemas.openxmlformats.org/drawingml/2006/main" xmlns:r="http://schemas.openxmlformats.org/officeDocument/2006/relationships" xmlns:p="http://schemas.openxmlformats.org/presentationml/2006/main">
+  <p:cSld>
+    <p:spTree>
+      <p:nvGrpSpPr>
+        <p:cNvPr id="1" name=""/>
+        <p:cNvGrpSpPr/>
+        <p:nvPr/>
+      </p:nvGrpSpPr>
+      <p:grpSpPr>
+        <a:xfrm>
+          <a:off x="0" y="0"/>
+          <a:ext cx="0" cy="0"/>
+          <a:chOff x="0" y="0"/>
+          <a:chExt cx="0" cy="0"/>
+        </a:xfrm>
+      </p:grpSpPr>
+      <p:sp>
+        <p:nvSpPr>
+          <p:cNvPr id="2" name="Título 1">
+            <a:extLst>
+              <a:ext uri="{FF2B5EF4-FFF2-40B4-BE49-F238E27FC236}">
+                <a16:creationId xmlns:a16="http://schemas.microsoft.com/office/drawing/2014/main" id="{6C9FBC37-A4DC-42B0-93BE-431C67A2D247}"/>
+              </a:ext>
+            </a:extLst>
+          </p:cNvPr>
+          <p:cNvSpPr>
+            <a:spLocks noGrp="1"/>
+          </p:cNvSpPr>
+          <p:nvPr>
+            <p:ph type="title"/>
+          </p:nvPr>
+        </p:nvSpPr>
+        <p:spPr/>
+        <p:txBody>
+          <a:bodyPr/>
+          <a:lstStyle/>
+          <a:p>
+            <a:r>
+              <a:rPr lang="pt-PT" dirty="0">
+                <a:solidFill>
+                  <a:schemeClr val="bg1">
+                    <a:lumMod val="50000"/>
+                  </a:schemeClr>
+                </a:solidFill>
+              </a:rPr>
+              <a:t>Motivação e Objetivos</a:t>
+            </a:r>
+          </a:p>
+        </p:txBody>
+      </p:sp>
+      <p:sp>
+        <p:nvSpPr>
+          <p:cNvPr id="3" name="Marcador de Posição de Conteúdo 2">
+            <a:extLst>
+              <a:ext uri="{FF2B5EF4-FFF2-40B4-BE49-F238E27FC236}">
+                <a16:creationId xmlns:a16="http://schemas.microsoft.com/office/drawing/2014/main" id="{5EE258BC-B64A-4F62-8241-57130EEF2895}"/>
+              </a:ext>
+            </a:extLst>
+          </p:cNvPr>
+          <p:cNvSpPr>
+            <a:spLocks noGrp="1"/>
+          </p:cNvSpPr>
+          <p:nvPr>
+            <p:ph idx="1"/>
+          </p:nvPr>
+        </p:nvSpPr>
+        <p:spPr>
+          <a:xfrm>
+            <a:off x="1097280" y="1930401"/>
+            <a:ext cx="10058400" cy="4023360"/>
+          </a:xfrm>
+        </p:spPr>
+        <p:txBody>
+          <a:bodyPr/>
+          <a:lstStyle/>
+          <a:p>
+            <a:pPr>
+              <a:buFont typeface="Wingdings" panose="05000000000000000000" pitchFamily="2" charset="2"/>
+              <a:buChar char="q"/>
+            </a:pPr>
+            <a:r>
+              <a:rPr lang="pt-PT" dirty="0"/>
+              <a:t> Tornar o sistema “Leonardo” mais interativo, amigável e cativante;</a:t>
+            </a:r>
+          </a:p>
+          <a:p>
+            <a:pPr>
+              <a:buFont typeface="Wingdings" panose="05000000000000000000" pitchFamily="2" charset="2"/>
+              <a:buChar char="q"/>
+            </a:pPr>
+            <a:r>
+              <a:rPr lang="pt-PT" dirty="0"/>
+              <a:t> Capacidade de desenvolver diálogos mais expeditos com os utilizadores;</a:t>
+            </a:r>
+          </a:p>
+          <a:p>
+            <a:pPr>
+              <a:buFont typeface="Wingdings" panose="05000000000000000000" pitchFamily="2" charset="2"/>
+              <a:buChar char="q"/>
+            </a:pPr>
+            <a:endParaRPr lang="pt-PT" dirty="0"/>
+          </a:p>
+          <a:p>
+            <a:pPr>
+              <a:buFont typeface="Wingdings" panose="05000000000000000000" pitchFamily="2" charset="2"/>
+              <a:buChar char="q"/>
+            </a:pPr>
+            <a:r>
+              <a:rPr lang="pt-PT" dirty="0"/>
+              <a:t> Criar um componente autónomo, capaz de interatuar com os outros módulos do sistema e de fácil integração (e manutenção) no sistema geral;</a:t>
+            </a:r>
+          </a:p>
+          <a:p>
+            <a:pPr>
+              <a:buFont typeface="Wingdings" panose="05000000000000000000" pitchFamily="2" charset="2"/>
+              <a:buChar char="q"/>
+            </a:pPr>
+            <a:r>
+              <a:rPr lang="pt-PT" dirty="0"/>
+              <a:t> Desenvolver um sistema de diálogos que dispõe frases à medida do contexto e com alguma capacidade de adaptação a cada estado de um processo de avaliação.</a:t>
+            </a:r>
+          </a:p>
+          <a:p>
+            <a:pPr>
+              <a:buFont typeface="Wingdings" panose="05000000000000000000" pitchFamily="2" charset="2"/>
+              <a:buChar char="q"/>
+            </a:pPr>
+            <a:endParaRPr lang="pt-PT" dirty="0"/>
+          </a:p>
+          <a:p>
+            <a:pPr>
+              <a:buFont typeface="Wingdings" panose="05000000000000000000" pitchFamily="2" charset="2"/>
+              <a:buChar char="q"/>
+            </a:pPr>
+            <a:endParaRPr lang="pt-PT" dirty="0"/>
+          </a:p>
+          <a:p>
+            <a:pPr>
+              <a:buFont typeface="Wingdings" panose="05000000000000000000" pitchFamily="2" charset="2"/>
+              <a:buChar char="q"/>
+            </a:pPr>
+            <a:endParaRPr lang="pt-PT" dirty="0"/>
+          </a:p>
+        </p:txBody>
+      </p:sp>
+    </p:spTree>
+    <p:extLst>
+      <p:ext uri="{BB962C8B-B14F-4D97-AF65-F5344CB8AC3E}">
+        <p14:creationId xmlns:p14="http://schemas.microsoft.com/office/powerpoint/2010/main" val="1730745467"/>
+      </p:ext>
+    </p:extLst>
+  </p:cSld>
+  <p:clrMapOvr>
+    <a:masterClrMapping/>
+  </p:clrMapOvr>
+  <p:transition spd="slow">
+    <p:cover/>
+  </p:transition>
+</p:sld>
+</file>
+
+<file path=ppt/slides/slide5.xml><?xml version="1.0" encoding="utf-8"?>
+<p:sld xmlns:a="http://schemas.openxmlformats.org/drawingml/2006/main" xmlns:r="http://schemas.openxmlformats.org/officeDocument/2006/relationships" xmlns:p="http://schemas.openxmlformats.org/presentationml/2006/main">
+  <p:cSld>
+    <p:spTree>
+      <p:nvGrpSpPr>
+        <p:cNvPr id="1" name=""/>
+        <p:cNvGrpSpPr/>
+        <p:nvPr/>
+      </p:nvGrpSpPr>
+      <p:grpSpPr>
+        <a:xfrm>
+          <a:off x="0" y="0"/>
+          <a:ext cx="0" cy="0"/>
+          <a:chOff x="0" y="0"/>
+          <a:chExt cx="0" cy="0"/>
+        </a:xfrm>
+      </p:grpSpPr>
+      <p:sp>
+        <p:nvSpPr>
+          <p:cNvPr id="2" name="Título 1">
+            <a:extLst>
+              <a:ext uri="{FF2B5EF4-FFF2-40B4-BE49-F238E27FC236}">
+                <a16:creationId xmlns:a16="http://schemas.microsoft.com/office/drawing/2014/main" id="{24F245C3-7856-4137-8F16-426D92DD6269}"/>
+              </a:ext>
+            </a:extLst>
+          </p:cNvPr>
+          <p:cNvSpPr>
+            <a:spLocks noGrp="1"/>
+          </p:cNvSpPr>
+          <p:nvPr>
+            <p:ph type="title"/>
+          </p:nvPr>
+        </p:nvSpPr>
+        <p:spPr/>
+        <p:txBody>
+          <a:bodyPr/>
+          <a:lstStyle/>
+          <a:p>
+            <a:r>
+              <a:rPr lang="pt-PT" dirty="0"/>
+              <a:t>Trabalhos Relacionados</a:t>
+            </a:r>
+          </a:p>
+        </p:txBody>
+      </p:sp>
+      <p:sp>
+        <p:nvSpPr>
+          <p:cNvPr id="3" name="Marcador de Posição de Conteúdo 2">
+            <a:extLst>
+              <a:ext uri="{FF2B5EF4-FFF2-40B4-BE49-F238E27FC236}">
+                <a16:creationId xmlns:a16="http://schemas.microsoft.com/office/drawing/2014/main" id="{405FD468-00CA-4D64-8AF2-3DA2C744E8AC}"/>
+              </a:ext>
+            </a:extLst>
+          </p:cNvPr>
+          <p:cNvSpPr>
+            <a:spLocks noGrp="1"/>
+          </p:cNvSpPr>
+          <p:nvPr>
+            <p:ph idx="1"/>
+          </p:nvPr>
+        </p:nvSpPr>
+        <p:spPr/>
+        <p:txBody>
+          <a:bodyPr>
+            <a:normAutofit/>
+          </a:bodyPr>
+          <a:lstStyle/>
+          <a:p>
+            <a:pPr>
+              <a:buFont typeface="Wingdings" panose="05000000000000000000" pitchFamily="2" charset="2"/>
+              <a:buChar char="q"/>
+            </a:pPr>
+            <a:r>
+              <a:rPr lang="pt-PT" dirty="0"/>
+              <a:t> </a:t>
+            </a:r>
+            <a:r>
+              <a:rPr lang="pt-PT" dirty="0" err="1"/>
+              <a:t>Duolingo</a:t>
+            </a:r>
+            <a:endParaRPr lang="pt-PT" dirty="0"/>
+          </a:p>
+          <a:p>
+            <a:pPr lvl="1">
+              <a:buFont typeface="Wingdings" panose="05000000000000000000" pitchFamily="2" charset="2"/>
+              <a:buChar char="q"/>
+            </a:pPr>
+            <a:r>
+              <a:rPr lang="pt-PT" dirty="0"/>
+              <a:t> Possui vários “tutores” que comunicam com o utilizador de forma diferente;</a:t>
+            </a:r>
+          </a:p>
+          <a:p>
+            <a:pPr lvl="1">
+              <a:buFont typeface="Wingdings" panose="05000000000000000000" pitchFamily="2" charset="2"/>
+              <a:buChar char="q"/>
+            </a:pPr>
+            <a:r>
+              <a:rPr lang="pt-PT" dirty="0"/>
+              <a:t> Parabeniza o utilizador com moedas virtuais que permitem desbloquear outros</a:t>
+            </a:r>
+          </a:p>
+          <a:p>
+            <a:pPr marL="201168" lvl="1" indent="0">
+              <a:buNone/>
+            </a:pPr>
+            <a:r>
+              <a:rPr lang="pt-PT" dirty="0"/>
+              <a:t> níveis de aprendizagem;</a:t>
+            </a:r>
+          </a:p>
+          <a:p>
+            <a:pPr lvl="1">
+              <a:buFont typeface="Wingdings" panose="05000000000000000000" pitchFamily="2" charset="2"/>
+              <a:buChar char="q"/>
+            </a:pPr>
+            <a:endParaRPr lang="pt-PT" dirty="0"/>
+          </a:p>
+          <a:p>
+            <a:pPr>
+              <a:buFont typeface="Wingdings" panose="05000000000000000000" pitchFamily="2" charset="2"/>
+              <a:buChar char="q"/>
+            </a:pPr>
+            <a:r>
+              <a:rPr lang="pt-PT" dirty="0"/>
+              <a:t> </a:t>
+            </a:r>
+            <a:r>
+              <a:rPr lang="pt-PT" dirty="0" err="1"/>
+              <a:t>ChatBot</a:t>
+            </a:r>
+            <a:endParaRPr lang="pt-PT" dirty="0"/>
+          </a:p>
+          <a:p>
+            <a:pPr lvl="1">
+              <a:buFont typeface="Wingdings" panose="05000000000000000000" pitchFamily="2" charset="2"/>
+              <a:buChar char="q"/>
+            </a:pPr>
+            <a:r>
+              <a:rPr lang="pt-PT" dirty="0"/>
+              <a:t> É capaz de responder com imagens/links;</a:t>
+            </a:r>
+          </a:p>
+          <a:p>
+            <a:pPr lvl="1">
+              <a:buFont typeface="Wingdings" panose="05000000000000000000" pitchFamily="2" charset="2"/>
+              <a:buChar char="q"/>
+            </a:pPr>
+            <a:r>
+              <a:rPr lang="pt-PT" dirty="0"/>
+              <a:t> Utiliza técnicas de </a:t>
+            </a:r>
+            <a:r>
+              <a:rPr lang="en-US" dirty="0"/>
+              <a:t>Machine </a:t>
+            </a:r>
+            <a:r>
+              <a:rPr lang="pt-PT" dirty="0" err="1"/>
+              <a:t>Learning</a:t>
+            </a:r>
+            <a:r>
+              <a:rPr lang="pt-PT" dirty="0"/>
+              <a:t> para otimizar as interações com os clientes;</a:t>
+            </a:r>
+          </a:p>
+          <a:p>
+            <a:pPr marL="201168" lvl="1" indent="0">
+              <a:buNone/>
+            </a:pPr>
+            <a:endParaRPr lang="pt-PT" dirty="0"/>
+          </a:p>
+          <a:p>
+            <a:pPr marL="201168" lvl="1" indent="0">
+              <a:buNone/>
+            </a:pPr>
+            <a:endParaRPr lang="pt-PT" dirty="0">
+              <a:hlinkClick r:id="rId3"/>
+            </a:endParaRPr>
+          </a:p>
+          <a:p>
+            <a:pPr marL="201168" lvl="1" indent="0">
+              <a:buNone/>
+            </a:pPr>
+            <a:r>
+              <a:rPr lang="pt-PT" dirty="0">
+                <a:hlinkClick r:id="rId4"/>
+              </a:rPr>
+              <a:t>https://www.duolingo.com/</a:t>
+            </a:r>
+            <a:r>
+              <a:rPr lang="pt-PT" dirty="0"/>
+              <a:t> ; </a:t>
+            </a:r>
+            <a:r>
+              <a:rPr lang="pt-PT" dirty="0">
+                <a:hlinkClick r:id="rId3"/>
+              </a:rPr>
+              <a:t>https://www.chatbot.com/</a:t>
+            </a:r>
+            <a:r>
+              <a:rPr lang="pt-PT" dirty="0"/>
+              <a:t> </a:t>
+            </a:r>
+          </a:p>
+        </p:txBody>
+      </p:sp>
+      <p:pic>
+        <p:nvPicPr>
+          <p:cNvPr id="5" name="Imagem 4">
+            <a:extLst>
+              <a:ext uri="{FF2B5EF4-FFF2-40B4-BE49-F238E27FC236}">
+                <a16:creationId xmlns:a16="http://schemas.microsoft.com/office/drawing/2014/main" id="{424D4025-D7FC-4DC4-981D-D3498949F89C}"/>
+              </a:ext>
+            </a:extLst>
+          </p:cNvPr>
+          <p:cNvPicPr>
+            <a:picLocks noChangeAspect="1"/>
+          </p:cNvPicPr>
+          <p:nvPr/>
+        </p:nvPicPr>
+        <p:blipFill>
+          <a:blip r:embed="rId5">
+            <a:extLst>
+              <a:ext uri="{28A0092B-C50C-407E-A947-70E740481C1C}">
+                <a14:useLocalDpi xmlns:a14="http://schemas.microsoft.com/office/drawing/2010/main" val="0"/>
+              </a:ext>
+            </a:extLst>
+          </a:blip>
+          <a:stretch>
+            <a:fillRect/>
+          </a:stretch>
+        </p:blipFill>
+        <p:spPr>
+          <a:xfrm>
+            <a:off x="7541892" y="4681623"/>
+            <a:ext cx="3240169" cy="961694"/>
+          </a:xfrm>
+          <a:prstGeom prst="rect">
+            <a:avLst/>
+          </a:prstGeom>
+        </p:spPr>
+      </p:pic>
+      <p:pic>
+        <p:nvPicPr>
+          <p:cNvPr id="7" name="Imagem 6">
+            <a:extLst>
+              <a:ext uri="{FF2B5EF4-FFF2-40B4-BE49-F238E27FC236}">
+                <a16:creationId xmlns:a16="http://schemas.microsoft.com/office/drawing/2014/main" id="{269FC6D5-6F5C-4ABF-B03B-1EF8B1C29F22}"/>
+              </a:ext>
+            </a:extLst>
+          </p:cNvPr>
+          <p:cNvPicPr>
+            <a:picLocks noChangeAspect="1"/>
+          </p:cNvPicPr>
+          <p:nvPr/>
+        </p:nvPicPr>
+        <p:blipFill>
+          <a:blip r:embed="rId6">
+            <a:extLst>
+              <a:ext uri="{28A0092B-C50C-407E-A947-70E740481C1C}">
+                <a14:useLocalDpi xmlns:a14="http://schemas.microsoft.com/office/drawing/2010/main" val="0"/>
+              </a:ext>
+            </a:extLst>
+          </a:blip>
+          <a:stretch>
+            <a:fillRect/>
+          </a:stretch>
+        </p:blipFill>
+        <p:spPr>
+          <a:xfrm>
+            <a:off x="8951831" y="1845734"/>
+            <a:ext cx="3240169" cy="1705567"/>
+          </a:xfrm>
+          <a:prstGeom prst="rect">
+            <a:avLst/>
+          </a:prstGeom>
+        </p:spPr>
+      </p:pic>
+    </p:spTree>
+    <p:extLst>
+      <p:ext uri="{BB962C8B-B14F-4D97-AF65-F5344CB8AC3E}">
+        <p14:creationId xmlns:p14="http://schemas.microsoft.com/office/powerpoint/2010/main" val="2585317503"/>
+      </p:ext>
+    </p:extLst>
+  </p:cSld>
+  <p:clrMapOvr>
+    <a:masterClrMapping/>
+  </p:clrMapOvr>
+</p:sld>
+</file>
+
+<file path=ppt/slides/slide6.xml><?xml version="1.0" encoding="utf-8"?>
+<p:sld xmlns:a="http://schemas.openxmlformats.org/drawingml/2006/main" xmlns:r="http://schemas.openxmlformats.org/officeDocument/2006/relationships" xmlns:p="http://schemas.openxmlformats.org/presentationml/2006/main">
+  <p:cSld>
+    <p:spTree>
+      <p:nvGrpSpPr>
+        <p:cNvPr id="1" name=""/>
+        <p:cNvGrpSpPr/>
+        <p:nvPr/>
+      </p:nvGrpSpPr>
+      <p:grpSpPr>
+        <a:xfrm>
+          <a:off x="0" y="0"/>
+          <a:ext cx="0" cy="0"/>
+          <a:chOff x="0" y="0"/>
+          <a:chExt cx="0" cy="0"/>
+        </a:xfrm>
+      </p:grpSpPr>
+      <p:sp>
+        <p:nvSpPr>
+          <p:cNvPr id="2" name="Título 1">
+            <a:extLst>
+              <a:ext uri="{FF2B5EF4-FFF2-40B4-BE49-F238E27FC236}">
+                <a16:creationId xmlns:a16="http://schemas.microsoft.com/office/drawing/2014/main" id="{E7F3627F-344B-4BBB-AE8A-D976F33B76F1}"/>
+              </a:ext>
+            </a:extLst>
+          </p:cNvPr>
+          <p:cNvSpPr>
+            <a:spLocks noGrp="1"/>
+          </p:cNvSpPr>
+          <p:nvPr>
+            <p:ph type="title"/>
+          </p:nvPr>
+        </p:nvSpPr>
+        <p:spPr/>
+        <p:txBody>
+          <a:bodyPr/>
+          <a:lstStyle/>
+          <a:p>
+            <a:r>
+              <a:rPr lang="pt-PT" dirty="0">
+                <a:solidFill>
+                  <a:schemeClr val="bg1">
+                    <a:lumMod val="50000"/>
+                  </a:schemeClr>
+                </a:solidFill>
+              </a:rPr>
+              <a:t>Conclusões e Trabalho futuro</a:t>
             </a:r>
           </a:p>
         </p:txBody>
@@ -6286,8 +5962,12 @@
               <a:buChar char="q"/>
             </a:pPr>
             <a:r>
-              <a:rPr lang="pt-PT" dirty="0"/>
-              <a:t> Tema interessante e fora da área de trabalho comum do grupo.</a:t>
+              <a:rPr lang="pt-PT" dirty="0">
+                <a:solidFill>
+                  <a:schemeClr val="tx1"/>
+                </a:solidFill>
+              </a:rPr>
+              <a:t> O componente corresponde às expectativas e aos objetivos implementados.</a:t>
             </a:r>
           </a:p>
           <a:p>
@@ -6296,65 +5976,27 @@
               <a:buChar char="q"/>
             </a:pPr>
             <a:r>
-              <a:rPr lang="pt-PT" dirty="0"/>
-              <a:t> Nesta fase:</a:t>
-            </a:r>
-          </a:p>
-          <a:p>
-            <a:pPr lvl="1">
+              <a:rPr lang="pt-PT" dirty="0">
+                <a:solidFill>
+                  <a:schemeClr val="tx1"/>
+                </a:solidFill>
+              </a:rPr>
+              <a:t> O componente é capaz de improvisar e de se adaptar ao contexto porém, esta capacidade provém de um trabalho manual e exaustivo.</a:t>
+            </a:r>
+          </a:p>
+          <a:p>
+            <a:pPr>
               <a:buFont typeface="Wingdings" panose="05000000000000000000" pitchFamily="2" charset="2"/>
               <a:buChar char="q"/>
             </a:pPr>
             <a:r>
-              <a:rPr lang="pt-PT" dirty="0"/>
-              <a:t> Constituição da base de conhecimento para as falas do diálogo (em constante alteração);</a:t>
-            </a:r>
-          </a:p>
-          <a:p>
-            <a:pPr lvl="1">
-              <a:buFont typeface="Wingdings" panose="05000000000000000000" pitchFamily="2" charset="2"/>
-              <a:buChar char="q"/>
-            </a:pPr>
-            <a:r>
-              <a:rPr lang="pt-PT" dirty="0"/>
-              <a:t> Geração autónoma de frases;</a:t>
-            </a:r>
-          </a:p>
-          <a:p>
-            <a:pPr lvl="1">
-              <a:buFont typeface="Wingdings" panose="05000000000000000000" pitchFamily="2" charset="2"/>
-              <a:buChar char="q"/>
-            </a:pPr>
-            <a:r>
-              <a:rPr lang="pt-PT" dirty="0"/>
-              <a:t> Configuração do padrão (em constante alteração);</a:t>
-            </a:r>
-          </a:p>
-          <a:p>
-            <a:pPr lvl="1">
-              <a:buFont typeface="Wingdings" panose="05000000000000000000" pitchFamily="2" charset="2"/>
-              <a:buChar char="q"/>
-            </a:pPr>
-            <a:r>
-              <a:rPr lang="pt-PT" dirty="0"/>
-              <a:t> Desenvolvimento do analisador do padrão;</a:t>
-            </a:r>
-          </a:p>
-          <a:p>
-            <a:pPr lvl="1">
-              <a:buFont typeface="Wingdings" panose="05000000000000000000" pitchFamily="2" charset="2"/>
-              <a:buChar char="q"/>
-            </a:pPr>
-            <a:r>
-              <a:rPr lang="pt-PT" dirty="0"/>
-              <a:t> Desenvolvimento do motor de regras.</a:t>
-            </a:r>
-          </a:p>
-          <a:p>
-            <a:pPr marL="201168" lvl="1" indent="0">
-              <a:buNone/>
-            </a:pPr>
-            <a:endParaRPr lang="pt-PT" dirty="0"/>
+              <a:rPr lang="pt-PT" dirty="0">
+                <a:solidFill>
+                  <a:schemeClr val="tx1"/>
+                </a:solidFill>
+              </a:rPr>
+              <a:t> No futuro poderiam ser acrescentadas mais variáveis ao padrão e tornar o componente mais específico.</a:t>
+            </a:r>
           </a:p>
         </p:txBody>
       </p:sp>
@@ -6374,133 +6016,7 @@
 </p:sld>
 </file>
 
-<file path=ppt/slides/slide11.xml><?xml version="1.0" encoding="utf-8"?>
-<p:sld xmlns:a="http://schemas.openxmlformats.org/drawingml/2006/main" xmlns:r="http://schemas.openxmlformats.org/officeDocument/2006/relationships" xmlns:p="http://schemas.openxmlformats.org/presentationml/2006/main">
-  <p:cSld>
-    <p:spTree>
-      <p:nvGrpSpPr>
-        <p:cNvPr id="1" name=""/>
-        <p:cNvGrpSpPr/>
-        <p:nvPr/>
-      </p:nvGrpSpPr>
-      <p:grpSpPr>
-        <a:xfrm>
-          <a:off x="0" y="0"/>
-          <a:ext cx="0" cy="0"/>
-          <a:chOff x="0" y="0"/>
-          <a:chExt cx="0" cy="0"/>
-        </a:xfrm>
-      </p:grpSpPr>
-      <p:sp>
-        <p:nvSpPr>
-          <p:cNvPr id="2" name="Título 1">
-            <a:extLst>
-              <a:ext uri="{FF2B5EF4-FFF2-40B4-BE49-F238E27FC236}">
-                <a16:creationId xmlns:a16="http://schemas.microsoft.com/office/drawing/2014/main" id="{E7F3627F-344B-4BBB-AE8A-D976F33B76F1}"/>
-              </a:ext>
-            </a:extLst>
-          </p:cNvPr>
-          <p:cNvSpPr>
-            <a:spLocks noGrp="1"/>
-          </p:cNvSpPr>
-          <p:nvPr>
-            <p:ph type="title"/>
-          </p:nvPr>
-        </p:nvSpPr>
-        <p:spPr/>
-        <p:txBody>
-          <a:bodyPr/>
-          <a:lstStyle/>
-          <a:p>
-            <a:r>
-              <a:rPr lang="pt-PT" dirty="0">
-                <a:solidFill>
-                  <a:schemeClr val="bg1">
-                    <a:lumMod val="50000"/>
-                  </a:schemeClr>
-                </a:solidFill>
-              </a:rPr>
-              <a:t>Trabalho Futuro</a:t>
-            </a:r>
-          </a:p>
-        </p:txBody>
-      </p:sp>
-      <p:sp>
-        <p:nvSpPr>
-          <p:cNvPr id="3" name="Marcador de Posição de Conteúdo 2">
-            <a:extLst>
-              <a:ext uri="{FF2B5EF4-FFF2-40B4-BE49-F238E27FC236}">
-                <a16:creationId xmlns:a16="http://schemas.microsoft.com/office/drawing/2014/main" id="{8FF2DE50-49B0-47EC-8D7A-0F77D0C69A13}"/>
-              </a:ext>
-            </a:extLst>
-          </p:cNvPr>
-          <p:cNvSpPr>
-            <a:spLocks noGrp="1"/>
-          </p:cNvSpPr>
-          <p:nvPr>
-            <p:ph idx="1"/>
-          </p:nvPr>
-        </p:nvSpPr>
-        <p:spPr>
-          <a:xfrm>
-            <a:off x="1208493" y="1964266"/>
-            <a:ext cx="10058400" cy="4023360"/>
-          </a:xfrm>
-        </p:spPr>
-        <p:txBody>
-          <a:bodyPr>
-            <a:normAutofit/>
-          </a:bodyPr>
-          <a:lstStyle/>
-          <a:p>
-            <a:pPr>
-              <a:buFont typeface="Wingdings" panose="05000000000000000000" pitchFamily="2" charset="2"/>
-              <a:buChar char="q"/>
-            </a:pPr>
-            <a:r>
-              <a:rPr lang="pt-PT" dirty="0"/>
-              <a:t> Esboço da árvore de decisão.</a:t>
-            </a:r>
-          </a:p>
-          <a:p>
-            <a:pPr>
-              <a:buFont typeface="Wingdings" panose="05000000000000000000" pitchFamily="2" charset="2"/>
-              <a:buChar char="q"/>
-            </a:pPr>
-            <a:r>
-              <a:rPr lang="pt-PT" dirty="0"/>
-              <a:t> Adição e aprimoramento de regras ao motor.</a:t>
-            </a:r>
-          </a:p>
-          <a:p>
-            <a:pPr>
-              <a:buFont typeface="Wingdings" panose="05000000000000000000" pitchFamily="2" charset="2"/>
-              <a:buChar char="q"/>
-            </a:pPr>
-            <a:r>
-              <a:rPr lang="pt-PT" dirty="0"/>
-              <a:t> Continuação do desenvolvimento do sistema atual.</a:t>
-            </a:r>
-          </a:p>
-        </p:txBody>
-      </p:sp>
-    </p:spTree>
-    <p:extLst>
-      <p:ext uri="{BB962C8B-B14F-4D97-AF65-F5344CB8AC3E}">
-        <p14:creationId xmlns:p14="http://schemas.microsoft.com/office/powerpoint/2010/main" val="2191826000"/>
-      </p:ext>
-    </p:extLst>
-  </p:cSld>
-  <p:clrMapOvr>
-    <a:masterClrMapping/>
-  </p:clrMapOvr>
-  <p:transition spd="slow">
-    <p:cover/>
-  </p:transition>
-</p:sld>
-</file>
-
-<file path=ppt/slides/slide12.xml><?xml version="1.0" encoding="utf-8"?>
+<file path=ppt/slides/slide7.xml><?xml version="1.0" encoding="utf-8"?>
 <p:sld xmlns:a="http://schemas.openxmlformats.org/drawingml/2006/main" xmlns:r="http://schemas.openxmlformats.org/officeDocument/2006/relationships" xmlns:p="http://schemas.openxmlformats.org/presentationml/2006/main">
   <p:cSld>
     <p:spTree>
@@ -6785,1538 +6301,6 @@
     <p:extLst>
       <p:ext uri="{BB962C8B-B14F-4D97-AF65-F5344CB8AC3E}">
         <p14:creationId xmlns:p14="http://schemas.microsoft.com/office/powerpoint/2010/main" val="615748169"/>
-      </p:ext>
-    </p:extLst>
-  </p:cSld>
-  <p:clrMapOvr>
-    <a:masterClrMapping/>
-  </p:clrMapOvr>
-  <p:transition spd="slow">
-    <p:cover/>
-  </p:transition>
-</p:sld>
-</file>
-
-<file path=ppt/slides/slide2.xml><?xml version="1.0" encoding="utf-8"?>
-<p:sld xmlns:a="http://schemas.openxmlformats.org/drawingml/2006/main" xmlns:r="http://schemas.openxmlformats.org/officeDocument/2006/relationships" xmlns:p="http://schemas.openxmlformats.org/presentationml/2006/main">
-  <p:cSld>
-    <p:spTree>
-      <p:nvGrpSpPr>
-        <p:cNvPr id="1" name=""/>
-        <p:cNvGrpSpPr/>
-        <p:nvPr/>
-      </p:nvGrpSpPr>
-      <p:grpSpPr>
-        <a:xfrm>
-          <a:off x="0" y="0"/>
-          <a:ext cx="0" cy="0"/>
-          <a:chOff x="0" y="0"/>
-          <a:chExt cx="0" cy="0"/>
-        </a:xfrm>
-      </p:grpSpPr>
-      <p:sp>
-        <p:nvSpPr>
-          <p:cNvPr id="2" name="Título 1">
-            <a:extLst>
-              <a:ext uri="{FF2B5EF4-FFF2-40B4-BE49-F238E27FC236}">
-                <a16:creationId xmlns:a16="http://schemas.microsoft.com/office/drawing/2014/main" id="{5C20F771-AF31-4EEC-ABD2-41F5084655DE}"/>
-              </a:ext>
-            </a:extLst>
-          </p:cNvPr>
-          <p:cNvSpPr>
-            <a:spLocks noGrp="1"/>
-          </p:cNvSpPr>
-          <p:nvPr>
-            <p:ph type="title"/>
-          </p:nvPr>
-        </p:nvSpPr>
-        <p:spPr/>
-        <p:txBody>
-          <a:bodyPr/>
-          <a:lstStyle/>
-          <a:p>
-            <a:r>
-              <a:rPr lang="pt-PT" dirty="0">
-                <a:solidFill>
-                  <a:schemeClr val="bg1">
-                    <a:lumMod val="50000"/>
-                  </a:schemeClr>
-                </a:solidFill>
-              </a:rPr>
-              <a:t>Estrutura da Apresentação</a:t>
-            </a:r>
-          </a:p>
-        </p:txBody>
-      </p:sp>
-      <p:sp>
-        <p:nvSpPr>
-          <p:cNvPr id="3" name="Marcador de Posição de Conteúdo 2">
-            <a:extLst>
-              <a:ext uri="{FF2B5EF4-FFF2-40B4-BE49-F238E27FC236}">
-                <a16:creationId xmlns:a16="http://schemas.microsoft.com/office/drawing/2014/main" id="{31943E7B-9CF1-4EA1-9275-257EF8B743C1}"/>
-              </a:ext>
-            </a:extLst>
-          </p:cNvPr>
-          <p:cNvSpPr>
-            <a:spLocks noGrp="1"/>
-          </p:cNvSpPr>
-          <p:nvPr>
-            <p:ph idx="1"/>
-          </p:nvPr>
-        </p:nvSpPr>
-        <p:spPr>
-          <a:xfrm>
-            <a:off x="1097280" y="1930884"/>
-            <a:ext cx="10058400" cy="4023360"/>
-          </a:xfrm>
-        </p:spPr>
-        <p:txBody>
-          <a:bodyPr/>
-          <a:lstStyle/>
-          <a:p>
-            <a:pPr>
-              <a:buFont typeface="Wingdings" panose="05000000000000000000" pitchFamily="2" charset="2"/>
-              <a:buChar char="q"/>
-            </a:pPr>
-            <a:r>
-              <a:rPr lang="pt-PT" dirty="0"/>
-              <a:t> Contextualização</a:t>
-            </a:r>
-          </a:p>
-          <a:p>
-            <a:pPr>
-              <a:buFont typeface="Wingdings" panose="05000000000000000000" pitchFamily="2" charset="2"/>
-              <a:buChar char="q"/>
-            </a:pPr>
-            <a:r>
-              <a:rPr lang="pt-PT" dirty="0"/>
-              <a:t> Motivação</a:t>
-            </a:r>
-          </a:p>
-          <a:p>
-            <a:pPr>
-              <a:buFont typeface="Wingdings" panose="05000000000000000000" pitchFamily="2" charset="2"/>
-              <a:buChar char="q"/>
-            </a:pPr>
-            <a:r>
-              <a:rPr lang="pt-PT" dirty="0"/>
-              <a:t> Objetivos</a:t>
-            </a:r>
-          </a:p>
-          <a:p>
-            <a:pPr>
-              <a:buFont typeface="Wingdings" panose="05000000000000000000" pitchFamily="2" charset="2"/>
-              <a:buChar char="q"/>
-            </a:pPr>
-            <a:r>
-              <a:rPr lang="pt-PT" dirty="0"/>
-              <a:t> Apresentação do Componente</a:t>
-            </a:r>
-          </a:p>
-          <a:p>
-            <a:pPr>
-              <a:buFont typeface="Wingdings" panose="05000000000000000000" pitchFamily="2" charset="2"/>
-              <a:buChar char="q"/>
-            </a:pPr>
-            <a:r>
-              <a:rPr lang="pt-PT" dirty="0"/>
-              <a:t> Ferramentas utilizadas</a:t>
-            </a:r>
-          </a:p>
-          <a:p>
-            <a:pPr>
-              <a:buFont typeface="Wingdings" panose="05000000000000000000" pitchFamily="2" charset="2"/>
-              <a:buChar char="q"/>
-            </a:pPr>
-            <a:r>
-              <a:rPr lang="pt-PT" dirty="0"/>
-              <a:t> Conclusão e Trabalho Futuro</a:t>
-            </a:r>
-          </a:p>
-        </p:txBody>
-      </p:sp>
-    </p:spTree>
-    <p:extLst>
-      <p:ext uri="{BB962C8B-B14F-4D97-AF65-F5344CB8AC3E}">
-        <p14:creationId xmlns:p14="http://schemas.microsoft.com/office/powerpoint/2010/main" val="1453793189"/>
-      </p:ext>
-    </p:extLst>
-  </p:cSld>
-  <p:clrMapOvr>
-    <a:masterClrMapping/>
-  </p:clrMapOvr>
-  <p:transition spd="slow">
-    <p:cover/>
-  </p:transition>
-</p:sld>
-</file>
-
-<file path=ppt/slides/slide3.xml><?xml version="1.0" encoding="utf-8"?>
-<p:sld xmlns:a="http://schemas.openxmlformats.org/drawingml/2006/main" xmlns:r="http://schemas.openxmlformats.org/officeDocument/2006/relationships" xmlns:p="http://schemas.openxmlformats.org/presentationml/2006/main">
-  <p:cSld>
-    <p:spTree>
-      <p:nvGrpSpPr>
-        <p:cNvPr id="1" name=""/>
-        <p:cNvGrpSpPr/>
-        <p:nvPr/>
-      </p:nvGrpSpPr>
-      <p:grpSpPr>
-        <a:xfrm>
-          <a:off x="0" y="0"/>
-          <a:ext cx="0" cy="0"/>
-          <a:chOff x="0" y="0"/>
-          <a:chExt cx="0" cy="0"/>
-        </a:xfrm>
-      </p:grpSpPr>
-      <p:sp>
-        <p:nvSpPr>
-          <p:cNvPr id="2" name="Título 1">
-            <a:extLst>
-              <a:ext uri="{FF2B5EF4-FFF2-40B4-BE49-F238E27FC236}">
-                <a16:creationId xmlns:a16="http://schemas.microsoft.com/office/drawing/2014/main" id="{9DA54CA6-DF71-42B3-BA6C-A5070B9A6FCF}"/>
-              </a:ext>
-            </a:extLst>
-          </p:cNvPr>
-          <p:cNvSpPr>
-            <a:spLocks noGrp="1"/>
-          </p:cNvSpPr>
-          <p:nvPr>
-            <p:ph type="title"/>
-          </p:nvPr>
-        </p:nvSpPr>
-        <p:spPr/>
-        <p:txBody>
-          <a:bodyPr/>
-          <a:lstStyle/>
-          <a:p>
-            <a:r>
-              <a:rPr lang="pt-PT" dirty="0">
-                <a:solidFill>
-                  <a:schemeClr val="bg1">
-                    <a:lumMod val="50000"/>
-                  </a:schemeClr>
-                </a:solidFill>
-              </a:rPr>
-              <a:t>Contextualização</a:t>
-            </a:r>
-          </a:p>
-        </p:txBody>
-      </p:sp>
-      <p:sp>
-        <p:nvSpPr>
-          <p:cNvPr id="3" name="Marcador de Posição de Conteúdo 2">
-            <a:extLst>
-              <a:ext uri="{FF2B5EF4-FFF2-40B4-BE49-F238E27FC236}">
-                <a16:creationId xmlns:a16="http://schemas.microsoft.com/office/drawing/2014/main" id="{9AC072B4-F76D-46EF-9BF9-52FD93046E58}"/>
-              </a:ext>
-            </a:extLst>
-          </p:cNvPr>
-          <p:cNvSpPr>
-            <a:spLocks noGrp="1"/>
-          </p:cNvSpPr>
-          <p:nvPr>
-            <p:ph idx="1"/>
-          </p:nvPr>
-        </p:nvSpPr>
-        <p:spPr>
-          <a:xfrm>
-            <a:off x="1097280" y="1930401"/>
-            <a:ext cx="10058400" cy="4023360"/>
-          </a:xfrm>
-        </p:spPr>
-        <p:txBody>
-          <a:bodyPr/>
-          <a:lstStyle/>
-          <a:p>
-            <a:pPr>
-              <a:buFont typeface="Wingdings" panose="05000000000000000000" pitchFamily="2" charset="2"/>
-              <a:buChar char="q"/>
-            </a:pPr>
-            <a:r>
-              <a:rPr lang="pt-PT" dirty="0"/>
-              <a:t> Projeto “Leonardo” surge como um sistema de avaliação de determinadas </a:t>
-            </a:r>
-            <a:r>
-              <a:rPr lang="pt-PT" dirty="0" err="1"/>
-              <a:t>UCs</a:t>
-            </a:r>
-            <a:r>
-              <a:rPr lang="pt-PT" dirty="0"/>
-              <a:t>:</a:t>
-            </a:r>
-          </a:p>
-          <a:p>
-            <a:pPr lvl="1">
-              <a:buFont typeface="Wingdings" panose="05000000000000000000" pitchFamily="2" charset="2"/>
-              <a:buChar char="q"/>
-            </a:pPr>
-            <a:r>
-              <a:rPr lang="pt-PT" dirty="0"/>
-              <a:t> Bases de Dados</a:t>
-            </a:r>
-          </a:p>
-          <a:p>
-            <a:pPr lvl="2">
-              <a:buFont typeface="Wingdings" panose="05000000000000000000" pitchFamily="2" charset="2"/>
-              <a:buChar char="q"/>
-            </a:pPr>
-            <a:r>
-              <a:rPr lang="pt-PT" dirty="0"/>
-              <a:t> Álgebra Relacional</a:t>
-            </a:r>
-          </a:p>
-          <a:p>
-            <a:pPr lvl="2">
-              <a:buFont typeface="Wingdings" panose="05000000000000000000" pitchFamily="2" charset="2"/>
-              <a:buChar char="q"/>
-            </a:pPr>
-            <a:r>
-              <a:rPr lang="pt-PT" dirty="0"/>
-              <a:t> Modelo Conceptual </a:t>
-            </a:r>
-          </a:p>
-          <a:p>
-            <a:pPr lvl="2">
-              <a:buFont typeface="Wingdings" panose="05000000000000000000" pitchFamily="2" charset="2"/>
-              <a:buChar char="q"/>
-            </a:pPr>
-            <a:r>
-              <a:rPr lang="pt-PT" dirty="0"/>
-              <a:t> Modelo Lógico</a:t>
-            </a:r>
-          </a:p>
-          <a:p>
-            <a:pPr lvl="2">
-              <a:buFont typeface="Wingdings" panose="05000000000000000000" pitchFamily="2" charset="2"/>
-              <a:buChar char="q"/>
-            </a:pPr>
-            <a:r>
-              <a:rPr lang="pt-PT" dirty="0"/>
-              <a:t>…</a:t>
-            </a:r>
-          </a:p>
-          <a:p>
-            <a:pPr>
-              <a:buFont typeface="Wingdings" panose="05000000000000000000" pitchFamily="2" charset="2"/>
-              <a:buChar char="q"/>
-            </a:pPr>
-            <a:r>
-              <a:rPr lang="pt-PT" dirty="0"/>
-              <a:t> Cada aluno tem um perfil</a:t>
-            </a:r>
-            <a:r>
-              <a:rPr lang="pt-PT" i="1" dirty="0"/>
-              <a:t>: </a:t>
-            </a:r>
-          </a:p>
-          <a:p>
-            <a:pPr lvl="1">
-              <a:buFont typeface="Wingdings" panose="05000000000000000000" pitchFamily="2" charset="2"/>
-              <a:buChar char="q"/>
-            </a:pPr>
-            <a:r>
-              <a:rPr lang="pt-PT" i="1" dirty="0"/>
-              <a:t> </a:t>
-            </a:r>
-            <a:r>
-              <a:rPr lang="pt-PT" dirty="0"/>
-              <a:t>Diferentes desempenhos e destrezas em vários temas avaliados;</a:t>
-            </a:r>
-          </a:p>
-          <a:p>
-            <a:pPr lvl="1">
-              <a:buFont typeface="Wingdings" panose="05000000000000000000" pitchFamily="2" charset="2"/>
-              <a:buChar char="q"/>
-            </a:pPr>
-            <a:r>
-              <a:rPr lang="pt-PT" dirty="0"/>
-              <a:t> “Personalidade” e “Sensibilidade”;</a:t>
-            </a:r>
-          </a:p>
-          <a:p>
-            <a:pPr>
-              <a:buFont typeface="Wingdings" panose="05000000000000000000" pitchFamily="2" charset="2"/>
-              <a:buChar char="q"/>
-            </a:pPr>
-            <a:r>
-              <a:rPr lang="pt-PT" dirty="0"/>
-              <a:t> Desenvolvimento de um gestor de diálogos como personificação do Leonardo.</a:t>
-            </a:r>
-          </a:p>
-          <a:p>
-            <a:endParaRPr lang="pt-PT" dirty="0"/>
-          </a:p>
-          <a:p>
-            <a:endParaRPr lang="pt-PT" dirty="0"/>
-          </a:p>
-        </p:txBody>
-      </p:sp>
-    </p:spTree>
-    <p:extLst>
-      <p:ext uri="{BB962C8B-B14F-4D97-AF65-F5344CB8AC3E}">
-        <p14:creationId xmlns:p14="http://schemas.microsoft.com/office/powerpoint/2010/main" val="3413792368"/>
-      </p:ext>
-    </p:extLst>
-  </p:cSld>
-  <p:clrMapOvr>
-    <a:masterClrMapping/>
-  </p:clrMapOvr>
-  <p:transition spd="slow">
-    <p:cover/>
-  </p:transition>
-</p:sld>
-</file>
-
-<file path=ppt/slides/slide4.xml><?xml version="1.0" encoding="utf-8"?>
-<p:sld xmlns:a="http://schemas.openxmlformats.org/drawingml/2006/main" xmlns:r="http://schemas.openxmlformats.org/officeDocument/2006/relationships" xmlns:p="http://schemas.openxmlformats.org/presentationml/2006/main">
-  <p:cSld>
-    <p:spTree>
-      <p:nvGrpSpPr>
-        <p:cNvPr id="1" name=""/>
-        <p:cNvGrpSpPr/>
-        <p:nvPr/>
-      </p:nvGrpSpPr>
-      <p:grpSpPr>
-        <a:xfrm>
-          <a:off x="0" y="0"/>
-          <a:ext cx="0" cy="0"/>
-          <a:chOff x="0" y="0"/>
-          <a:chExt cx="0" cy="0"/>
-        </a:xfrm>
-      </p:grpSpPr>
-      <p:sp>
-        <p:nvSpPr>
-          <p:cNvPr id="2" name="Título 1">
-            <a:extLst>
-              <a:ext uri="{FF2B5EF4-FFF2-40B4-BE49-F238E27FC236}">
-                <a16:creationId xmlns:a16="http://schemas.microsoft.com/office/drawing/2014/main" id="{6C9FBC37-A4DC-42B0-93BE-431C67A2D247}"/>
-              </a:ext>
-            </a:extLst>
-          </p:cNvPr>
-          <p:cNvSpPr>
-            <a:spLocks noGrp="1"/>
-          </p:cNvSpPr>
-          <p:nvPr>
-            <p:ph type="title"/>
-          </p:nvPr>
-        </p:nvSpPr>
-        <p:spPr/>
-        <p:txBody>
-          <a:bodyPr/>
-          <a:lstStyle/>
-          <a:p>
-            <a:r>
-              <a:rPr lang="pt-PT" dirty="0">
-                <a:solidFill>
-                  <a:schemeClr val="bg1">
-                    <a:lumMod val="50000"/>
-                  </a:schemeClr>
-                </a:solidFill>
-              </a:rPr>
-              <a:t>Motivação</a:t>
-            </a:r>
-          </a:p>
-        </p:txBody>
-      </p:sp>
-      <p:sp>
-        <p:nvSpPr>
-          <p:cNvPr id="3" name="Marcador de Posição de Conteúdo 2">
-            <a:extLst>
-              <a:ext uri="{FF2B5EF4-FFF2-40B4-BE49-F238E27FC236}">
-                <a16:creationId xmlns:a16="http://schemas.microsoft.com/office/drawing/2014/main" id="{5EE258BC-B64A-4F62-8241-57130EEF2895}"/>
-              </a:ext>
-            </a:extLst>
-          </p:cNvPr>
-          <p:cNvSpPr>
-            <a:spLocks noGrp="1"/>
-          </p:cNvSpPr>
-          <p:nvPr>
-            <p:ph idx="1"/>
-          </p:nvPr>
-        </p:nvSpPr>
-        <p:spPr>
-          <a:xfrm>
-            <a:off x="1097280" y="1930401"/>
-            <a:ext cx="10058400" cy="4023360"/>
-          </a:xfrm>
-        </p:spPr>
-        <p:txBody>
-          <a:bodyPr/>
-          <a:lstStyle/>
-          <a:p>
-            <a:pPr>
-              <a:buFont typeface="Wingdings" panose="05000000000000000000" pitchFamily="2" charset="2"/>
-              <a:buChar char="q"/>
-            </a:pPr>
-            <a:r>
-              <a:rPr lang="pt-PT" dirty="0"/>
-              <a:t> Tornar o sistema “Leonardo” mais interativo, amigável e cativante;</a:t>
-            </a:r>
-          </a:p>
-          <a:p>
-            <a:pPr>
-              <a:buFont typeface="Wingdings" panose="05000000000000000000" pitchFamily="2" charset="2"/>
-              <a:buChar char="q"/>
-            </a:pPr>
-            <a:r>
-              <a:rPr lang="pt-PT" dirty="0"/>
-              <a:t> Capacidade de desenvolver diálogos mais expeditos com os utilizadores;</a:t>
-            </a:r>
-          </a:p>
-          <a:p>
-            <a:pPr>
-              <a:buFont typeface="Wingdings" panose="05000000000000000000" pitchFamily="2" charset="2"/>
-              <a:buChar char="q"/>
-            </a:pPr>
-            <a:r>
-              <a:rPr lang="pt-PT" dirty="0"/>
-              <a:t> Incentivo à utilização do sistema durante um processo de avaliação;</a:t>
-            </a:r>
-          </a:p>
-        </p:txBody>
-      </p:sp>
-    </p:spTree>
-    <p:extLst>
-      <p:ext uri="{BB962C8B-B14F-4D97-AF65-F5344CB8AC3E}">
-        <p14:creationId xmlns:p14="http://schemas.microsoft.com/office/powerpoint/2010/main" val="1730745467"/>
-      </p:ext>
-    </p:extLst>
-  </p:cSld>
-  <p:clrMapOvr>
-    <a:masterClrMapping/>
-  </p:clrMapOvr>
-  <p:transition spd="slow">
-    <p:cover/>
-  </p:transition>
-</p:sld>
-</file>
-
-<file path=ppt/slides/slide5.xml><?xml version="1.0" encoding="utf-8"?>
-<p:sld xmlns:a="http://schemas.openxmlformats.org/drawingml/2006/main" xmlns:r="http://schemas.openxmlformats.org/officeDocument/2006/relationships" xmlns:p="http://schemas.openxmlformats.org/presentationml/2006/main">
-  <p:cSld>
-    <p:spTree>
-      <p:nvGrpSpPr>
-        <p:cNvPr id="1" name=""/>
-        <p:cNvGrpSpPr/>
-        <p:nvPr/>
-      </p:nvGrpSpPr>
-      <p:grpSpPr>
-        <a:xfrm>
-          <a:off x="0" y="0"/>
-          <a:ext cx="0" cy="0"/>
-          <a:chOff x="0" y="0"/>
-          <a:chExt cx="0" cy="0"/>
-        </a:xfrm>
-      </p:grpSpPr>
-      <p:sp>
-        <p:nvSpPr>
-          <p:cNvPr id="2" name="Título 1">
-            <a:extLst>
-              <a:ext uri="{FF2B5EF4-FFF2-40B4-BE49-F238E27FC236}">
-                <a16:creationId xmlns:a16="http://schemas.microsoft.com/office/drawing/2014/main" id="{DAD0529E-691C-49B6-AF9B-BBF8CBF4DF87}"/>
-              </a:ext>
-            </a:extLst>
-          </p:cNvPr>
-          <p:cNvSpPr>
-            <a:spLocks noGrp="1"/>
-          </p:cNvSpPr>
-          <p:nvPr>
-            <p:ph type="title"/>
-          </p:nvPr>
-        </p:nvSpPr>
-        <p:spPr/>
-        <p:txBody>
-          <a:bodyPr/>
-          <a:lstStyle/>
-          <a:p>
-            <a:r>
-              <a:rPr lang="pt-PT" dirty="0">
-                <a:solidFill>
-                  <a:schemeClr val="bg1">
-                    <a:lumMod val="50000"/>
-                  </a:schemeClr>
-                </a:solidFill>
-              </a:rPr>
-              <a:t>Objetivos</a:t>
-            </a:r>
-          </a:p>
-        </p:txBody>
-      </p:sp>
-      <p:sp>
-        <p:nvSpPr>
-          <p:cNvPr id="3" name="Marcador de Posição de Conteúdo 2">
-            <a:extLst>
-              <a:ext uri="{FF2B5EF4-FFF2-40B4-BE49-F238E27FC236}">
-                <a16:creationId xmlns:a16="http://schemas.microsoft.com/office/drawing/2014/main" id="{1A6D056D-46A0-4D10-B863-EB94981A8C46}"/>
-              </a:ext>
-            </a:extLst>
-          </p:cNvPr>
-          <p:cNvSpPr>
-            <a:spLocks noGrp="1"/>
-          </p:cNvSpPr>
-          <p:nvPr>
-            <p:ph idx="1"/>
-          </p:nvPr>
-        </p:nvSpPr>
-        <p:spPr>
-          <a:xfrm>
-            <a:off x="1097280" y="1929433"/>
-            <a:ext cx="10058400" cy="4023360"/>
-          </a:xfrm>
-        </p:spPr>
-        <p:txBody>
-          <a:bodyPr/>
-          <a:lstStyle/>
-          <a:p>
-            <a:pPr>
-              <a:buFont typeface="Wingdings" panose="05000000000000000000" pitchFamily="2" charset="2"/>
-              <a:buChar char="q"/>
-            </a:pPr>
-            <a:r>
-              <a:rPr lang="pt-PT" dirty="0"/>
-              <a:t> Criar um componente autónomo, capaz de interatuar com os outros módulos do sistema e de fácil integração (e manutenção) no sistema geral;</a:t>
-            </a:r>
-          </a:p>
-          <a:p>
-            <a:pPr>
-              <a:buFont typeface="Wingdings" panose="05000000000000000000" pitchFamily="2" charset="2"/>
-              <a:buChar char="q"/>
-            </a:pPr>
-            <a:r>
-              <a:rPr lang="pt-PT" dirty="0"/>
-              <a:t> Providenciar um sistema de geração de frases capaz de suportar os vários processos do sistema, em termos gerais e em termos de cada domínio de estudo, em particular;</a:t>
-            </a:r>
-          </a:p>
-          <a:p>
-            <a:pPr>
-              <a:buFont typeface="Wingdings" panose="05000000000000000000" pitchFamily="2" charset="2"/>
-              <a:buChar char="q"/>
-            </a:pPr>
-            <a:r>
-              <a:rPr lang="pt-PT" dirty="0"/>
-              <a:t> Desenvolver um sistema de diálogos que dispõe frases à medida do contexto e com alguma capacidade de adaptação a cada estado de um processo de avaliação.</a:t>
-            </a:r>
-          </a:p>
-        </p:txBody>
-      </p:sp>
-    </p:spTree>
-    <p:extLst>
-      <p:ext uri="{BB962C8B-B14F-4D97-AF65-F5344CB8AC3E}">
-        <p14:creationId xmlns:p14="http://schemas.microsoft.com/office/powerpoint/2010/main" val="1634778810"/>
-      </p:ext>
-    </p:extLst>
-  </p:cSld>
-  <p:clrMapOvr>
-    <a:masterClrMapping/>
-  </p:clrMapOvr>
-  <p:transition spd="slow">
-    <p:cover/>
-  </p:transition>
-</p:sld>
-</file>
-
-<file path=ppt/slides/slide6.xml><?xml version="1.0" encoding="utf-8"?>
-<p:sld xmlns:a="http://schemas.openxmlformats.org/drawingml/2006/main" xmlns:r="http://schemas.openxmlformats.org/officeDocument/2006/relationships" xmlns:p="http://schemas.openxmlformats.org/presentationml/2006/main">
-  <p:cSld>
-    <p:spTree>
-      <p:nvGrpSpPr>
-        <p:cNvPr id="1" name=""/>
-        <p:cNvGrpSpPr/>
-        <p:nvPr/>
-      </p:nvGrpSpPr>
-      <p:grpSpPr>
-        <a:xfrm>
-          <a:off x="0" y="0"/>
-          <a:ext cx="0" cy="0"/>
-          <a:chOff x="0" y="0"/>
-          <a:chExt cx="0" cy="0"/>
-        </a:xfrm>
-      </p:grpSpPr>
-      <p:sp>
-        <p:nvSpPr>
-          <p:cNvPr id="2" name="Título 1">
-            <a:extLst>
-              <a:ext uri="{FF2B5EF4-FFF2-40B4-BE49-F238E27FC236}">
-                <a16:creationId xmlns:a16="http://schemas.microsoft.com/office/drawing/2014/main" id="{C9DA4474-206D-415E-90A2-22F6698BD392}"/>
-              </a:ext>
-            </a:extLst>
-          </p:cNvPr>
-          <p:cNvSpPr>
-            <a:spLocks noGrp="1"/>
-          </p:cNvSpPr>
-          <p:nvPr>
-            <p:ph type="title"/>
-          </p:nvPr>
-        </p:nvSpPr>
-        <p:spPr/>
-        <p:txBody>
-          <a:bodyPr/>
-          <a:lstStyle/>
-          <a:p>
-            <a:r>
-              <a:rPr lang="pt-PT" dirty="0">
-                <a:solidFill>
-                  <a:schemeClr val="bg1">
-                    <a:lumMod val="50000"/>
-                  </a:schemeClr>
-                </a:solidFill>
-              </a:rPr>
-              <a:t>Apresentação do Componente</a:t>
-            </a:r>
-          </a:p>
-        </p:txBody>
-      </p:sp>
-      <p:pic>
-        <p:nvPicPr>
-          <p:cNvPr id="5" name="Imagem 4">
-            <a:extLst>
-              <a:ext uri="{FF2B5EF4-FFF2-40B4-BE49-F238E27FC236}">
-                <a16:creationId xmlns:a16="http://schemas.microsoft.com/office/drawing/2014/main" id="{A071BA8A-8BE0-477E-BBFF-00AE52C4F5FC}"/>
-              </a:ext>
-            </a:extLst>
-          </p:cNvPr>
-          <p:cNvPicPr>
-            <a:picLocks noChangeAspect="1"/>
-          </p:cNvPicPr>
-          <p:nvPr/>
-        </p:nvPicPr>
-        <p:blipFill>
-          <a:blip r:embed="rId3">
-            <a:extLst>
-              <a:ext uri="{28A0092B-C50C-407E-A947-70E740481C1C}">
-                <a14:useLocalDpi xmlns:a14="http://schemas.microsoft.com/office/drawing/2010/main" val="0"/>
-              </a:ext>
-            </a:extLst>
-          </a:blip>
-          <a:stretch>
-            <a:fillRect/>
-          </a:stretch>
-        </p:blipFill>
-        <p:spPr>
-          <a:xfrm>
-            <a:off x="2061599" y="3130967"/>
-            <a:ext cx="8068801" cy="3105583"/>
-          </a:xfrm>
-          <a:prstGeom prst="rect">
-            <a:avLst/>
-          </a:prstGeom>
-        </p:spPr>
-      </p:pic>
-      <p:sp>
-        <p:nvSpPr>
-          <p:cNvPr id="7" name="Marcador de Posição de Conteúdo 2">
-            <a:extLst>
-              <a:ext uri="{FF2B5EF4-FFF2-40B4-BE49-F238E27FC236}">
-                <a16:creationId xmlns:a16="http://schemas.microsoft.com/office/drawing/2014/main" id="{3EC6D872-E846-4670-BF08-540C59BD27FC}"/>
-              </a:ext>
-            </a:extLst>
-          </p:cNvPr>
-          <p:cNvSpPr>
-            <a:spLocks noGrp="1"/>
-          </p:cNvSpPr>
-          <p:nvPr>
-            <p:ph idx="1"/>
-          </p:nvPr>
-        </p:nvSpPr>
-        <p:spPr>
-          <a:xfrm>
-            <a:off x="1097280" y="1930401"/>
-            <a:ext cx="10058400" cy="1450757"/>
-          </a:xfrm>
-        </p:spPr>
-        <p:txBody>
-          <a:bodyPr>
-            <a:normAutofit fontScale="92500" lnSpcReduction="10000"/>
-          </a:bodyPr>
-          <a:lstStyle/>
-          <a:p>
-            <a:pPr>
-              <a:buFont typeface="Wingdings" panose="05000000000000000000" pitchFamily="2" charset="2"/>
-              <a:buChar char="q"/>
-            </a:pPr>
-            <a:r>
-              <a:rPr lang="pt-PT" dirty="0"/>
-              <a:t> Funcionalidade por subcomponente:</a:t>
-            </a:r>
-          </a:p>
-          <a:p>
-            <a:pPr lvl="1">
-              <a:buFont typeface="Wingdings" panose="05000000000000000000" pitchFamily="2" charset="2"/>
-              <a:buChar char="q"/>
-            </a:pPr>
-            <a:r>
-              <a:rPr lang="pt-PT" dirty="0"/>
-              <a:t> Análise do Padrão: Analisar padrão vindo de outra componente e extração/conversão de informação útil;</a:t>
-            </a:r>
-          </a:p>
-          <a:p>
-            <a:pPr lvl="1">
-              <a:buFont typeface="Wingdings" panose="05000000000000000000" pitchFamily="2" charset="2"/>
-              <a:buChar char="q"/>
-            </a:pPr>
-            <a:r>
-              <a:rPr lang="pt-PT" dirty="0"/>
-              <a:t> Motor de Regras: Análise de dados provenientes do padrão e realização de testes, comparando esses dados com as condições das regras, do motor de regras</a:t>
-            </a:r>
-          </a:p>
-          <a:p>
-            <a:pPr lvl="1">
-              <a:buFont typeface="Wingdings" panose="05000000000000000000" pitchFamily="2" charset="2"/>
-              <a:buChar char="q"/>
-            </a:pPr>
-            <a:r>
-              <a:rPr lang="pt-PT" dirty="0"/>
-              <a:t> Seleção de Diálogo: Através das estruturas de decisão, selecionar qual a frase a enviar ao utilizador.</a:t>
-            </a:r>
-          </a:p>
-          <a:p>
-            <a:pPr>
-              <a:buFont typeface="Wingdings" panose="05000000000000000000" pitchFamily="2" charset="2"/>
-              <a:buChar char="q"/>
-            </a:pPr>
-            <a:endParaRPr lang="pt-PT" dirty="0"/>
-          </a:p>
-        </p:txBody>
-      </p:sp>
-    </p:spTree>
-    <p:extLst>
-      <p:ext uri="{BB962C8B-B14F-4D97-AF65-F5344CB8AC3E}">
-        <p14:creationId xmlns:p14="http://schemas.microsoft.com/office/powerpoint/2010/main" val="3735119211"/>
-      </p:ext>
-    </p:extLst>
-  </p:cSld>
-  <p:clrMapOvr>
-    <a:masterClrMapping/>
-  </p:clrMapOvr>
-  <p:transition spd="slow">
-    <p:cover/>
-  </p:transition>
-</p:sld>
-</file>
-
-<file path=ppt/slides/slide7.xml><?xml version="1.0" encoding="utf-8"?>
-<p:sld xmlns:a="http://schemas.openxmlformats.org/drawingml/2006/main" xmlns:r="http://schemas.openxmlformats.org/officeDocument/2006/relationships" xmlns:p="http://schemas.openxmlformats.org/presentationml/2006/main">
-  <p:cSld>
-    <p:spTree>
-      <p:nvGrpSpPr>
-        <p:cNvPr id="1" name=""/>
-        <p:cNvGrpSpPr/>
-        <p:nvPr/>
-      </p:nvGrpSpPr>
-      <p:grpSpPr>
-        <a:xfrm>
-          <a:off x="0" y="0"/>
-          <a:ext cx="0" cy="0"/>
-          <a:chOff x="0" y="0"/>
-          <a:chExt cx="0" cy="0"/>
-        </a:xfrm>
-      </p:grpSpPr>
-      <p:sp>
-        <p:nvSpPr>
-          <p:cNvPr id="2" name="Título 1">
-            <a:extLst>
-              <a:ext uri="{FF2B5EF4-FFF2-40B4-BE49-F238E27FC236}">
-                <a16:creationId xmlns:a16="http://schemas.microsoft.com/office/drawing/2014/main" id="{C9DA4474-206D-415E-90A2-22F6698BD392}"/>
-              </a:ext>
-            </a:extLst>
-          </p:cNvPr>
-          <p:cNvSpPr>
-            <a:spLocks noGrp="1"/>
-          </p:cNvSpPr>
-          <p:nvPr>
-            <p:ph type="title"/>
-          </p:nvPr>
-        </p:nvSpPr>
-        <p:spPr/>
-        <p:txBody>
-          <a:bodyPr/>
-          <a:lstStyle/>
-          <a:p>
-            <a:r>
-              <a:rPr lang="pt-PT" dirty="0">
-                <a:solidFill>
-                  <a:schemeClr val="bg1">
-                    <a:lumMod val="50000"/>
-                  </a:schemeClr>
-                </a:solidFill>
-              </a:rPr>
-              <a:t>Apresentação do Componente</a:t>
-            </a:r>
-          </a:p>
-        </p:txBody>
-      </p:sp>
-      <p:pic>
-        <p:nvPicPr>
-          <p:cNvPr id="5" name="Imagem 4">
-            <a:extLst>
-              <a:ext uri="{FF2B5EF4-FFF2-40B4-BE49-F238E27FC236}">
-                <a16:creationId xmlns:a16="http://schemas.microsoft.com/office/drawing/2014/main" id="{A071BA8A-8BE0-477E-BBFF-00AE52C4F5FC}"/>
-              </a:ext>
-            </a:extLst>
-          </p:cNvPr>
-          <p:cNvPicPr>
-            <a:picLocks noChangeAspect="1"/>
-          </p:cNvPicPr>
-          <p:nvPr/>
-        </p:nvPicPr>
-        <p:blipFill>
-          <a:blip r:embed="rId3">
-            <a:extLst>
-              <a:ext uri="{28A0092B-C50C-407E-A947-70E740481C1C}">
-                <a14:useLocalDpi xmlns:a14="http://schemas.microsoft.com/office/drawing/2010/main" val="0"/>
-              </a:ext>
-            </a:extLst>
-          </a:blip>
-          <a:stretch>
-            <a:fillRect/>
-          </a:stretch>
-        </p:blipFill>
-        <p:spPr>
-          <a:xfrm>
-            <a:off x="2061599" y="2649491"/>
-            <a:ext cx="8068801" cy="3105583"/>
-          </a:xfrm>
-          <a:prstGeom prst="rect">
-            <a:avLst/>
-          </a:prstGeom>
-        </p:spPr>
-      </p:pic>
-      <p:sp>
-        <p:nvSpPr>
-          <p:cNvPr id="3" name="Oval 2">
-            <a:extLst>
-              <a:ext uri="{FF2B5EF4-FFF2-40B4-BE49-F238E27FC236}">
-                <a16:creationId xmlns:a16="http://schemas.microsoft.com/office/drawing/2014/main" id="{29E9DD23-BBFC-4EBB-BAD0-425A92F9B41A}"/>
-              </a:ext>
-            </a:extLst>
-          </p:cNvPr>
-          <p:cNvSpPr/>
-          <p:nvPr/>
-        </p:nvSpPr>
-        <p:spPr>
-          <a:xfrm>
-            <a:off x="10243820" y="3466254"/>
-            <a:ext cx="1219200" cy="1209041"/>
-          </a:xfrm>
-          <a:prstGeom prst="ellipse">
-            <a:avLst/>
-          </a:prstGeom>
-        </p:spPr>
-        <p:style>
-          <a:lnRef idx="3">
-            <a:schemeClr val="lt1"/>
-          </a:lnRef>
-          <a:fillRef idx="1">
-            <a:schemeClr val="accent1"/>
-          </a:fillRef>
-          <a:effectRef idx="1">
-            <a:schemeClr val="accent1"/>
-          </a:effectRef>
-          <a:fontRef idx="minor">
-            <a:schemeClr val="lt1"/>
-          </a:fontRef>
-        </p:style>
-        <p:txBody>
-          <a:bodyPr rtlCol="0" anchor="ctr"/>
-          <a:lstStyle/>
-          <a:p>
-            <a:pPr algn="ctr"/>
-            <a:endParaRPr lang="pt-PT"/>
-          </a:p>
-        </p:txBody>
-      </p:sp>
-      <p:sp>
-        <p:nvSpPr>
-          <p:cNvPr id="6" name="Oval 5">
-            <a:extLst>
-              <a:ext uri="{FF2B5EF4-FFF2-40B4-BE49-F238E27FC236}">
-                <a16:creationId xmlns:a16="http://schemas.microsoft.com/office/drawing/2014/main" id="{73DA8051-3890-44E6-B9AC-2008EEE802ED}"/>
-              </a:ext>
-            </a:extLst>
-          </p:cNvPr>
-          <p:cNvSpPr/>
-          <p:nvPr/>
-        </p:nvSpPr>
-        <p:spPr>
-          <a:xfrm>
-            <a:off x="639199" y="3466254"/>
-            <a:ext cx="1219200" cy="1209041"/>
-          </a:xfrm>
-          <a:prstGeom prst="ellipse">
-            <a:avLst/>
-          </a:prstGeom>
-        </p:spPr>
-        <p:style>
-          <a:lnRef idx="3">
-            <a:schemeClr val="lt1"/>
-          </a:lnRef>
-          <a:fillRef idx="1">
-            <a:schemeClr val="accent1"/>
-          </a:fillRef>
-          <a:effectRef idx="1">
-            <a:schemeClr val="accent1"/>
-          </a:effectRef>
-          <a:fontRef idx="minor">
-            <a:schemeClr val="lt1"/>
-          </a:fontRef>
-        </p:style>
-        <p:txBody>
-          <a:bodyPr rtlCol="0" anchor="ctr"/>
-          <a:lstStyle/>
-          <a:p>
-            <a:pPr algn="ctr"/>
-            <a:endParaRPr lang="pt-PT"/>
-          </a:p>
-        </p:txBody>
-      </p:sp>
-      <p:sp>
-        <p:nvSpPr>
-          <p:cNvPr id="4" name="CaixaDeTexto 3">
-            <a:extLst>
-              <a:ext uri="{FF2B5EF4-FFF2-40B4-BE49-F238E27FC236}">
-                <a16:creationId xmlns:a16="http://schemas.microsoft.com/office/drawing/2014/main" id="{D3649FF5-04AA-4E5C-A44C-3CCD9ADE4C05}"/>
-              </a:ext>
-            </a:extLst>
-          </p:cNvPr>
-          <p:cNvSpPr txBox="1"/>
-          <p:nvPr/>
-        </p:nvSpPr>
-        <p:spPr>
-          <a:xfrm>
-            <a:off x="639199" y="2649492"/>
-            <a:ext cx="2201333" cy="584775"/>
-          </a:xfrm>
-          <a:prstGeom prst="rect">
-            <a:avLst/>
-          </a:prstGeom>
-          <a:noFill/>
-        </p:spPr>
-        <p:txBody>
-          <a:bodyPr wrap="square" rtlCol="0">
-            <a:spAutoFit/>
-          </a:bodyPr>
-          <a:lstStyle/>
-          <a:p>
-            <a:r>
-              <a:rPr lang="pt-PT" sz="3200" i="1" dirty="0" err="1">
-                <a:solidFill>
-                  <a:schemeClr val="bg1">
-                    <a:lumMod val="50000"/>
-                  </a:schemeClr>
-                </a:solidFill>
-                <a:effectLst>
-                  <a:outerShdw blurRad="38100" dist="38100" dir="2700000" algn="tl">
-                    <a:srgbClr val="000000">
-                      <a:alpha val="43137"/>
-                    </a:srgbClr>
-                  </a:outerShdw>
-                </a:effectLst>
-              </a:rPr>
-              <a:t>Profiler</a:t>
-            </a:r>
-            <a:endParaRPr lang="pt-PT" sz="3200" i="1" dirty="0">
-              <a:solidFill>
-                <a:schemeClr val="bg1">
-                  <a:lumMod val="50000"/>
-                </a:schemeClr>
-              </a:solidFill>
-              <a:effectLst>
-                <a:outerShdw blurRad="38100" dist="38100" dir="2700000" algn="tl">
-                  <a:srgbClr val="000000">
-                    <a:alpha val="43137"/>
-                  </a:srgbClr>
-                </a:outerShdw>
-              </a:effectLst>
-            </a:endParaRPr>
-          </a:p>
-        </p:txBody>
-      </p:sp>
-      <p:sp>
-        <p:nvSpPr>
-          <p:cNvPr id="7" name="CaixaDeTexto 6">
-            <a:extLst>
-              <a:ext uri="{FF2B5EF4-FFF2-40B4-BE49-F238E27FC236}">
-                <a16:creationId xmlns:a16="http://schemas.microsoft.com/office/drawing/2014/main" id="{CD680EE5-899C-49B9-8F64-6501BABE3879}"/>
-              </a:ext>
-            </a:extLst>
-          </p:cNvPr>
-          <p:cNvSpPr txBox="1"/>
-          <p:nvPr/>
-        </p:nvSpPr>
-        <p:spPr>
-          <a:xfrm>
-            <a:off x="9990667" y="2649491"/>
-            <a:ext cx="2201333" cy="584775"/>
-          </a:xfrm>
-          <a:prstGeom prst="rect">
-            <a:avLst/>
-          </a:prstGeom>
-          <a:noFill/>
-        </p:spPr>
-        <p:txBody>
-          <a:bodyPr wrap="square" rtlCol="0">
-            <a:spAutoFit/>
-          </a:bodyPr>
-          <a:lstStyle/>
-          <a:p>
-            <a:r>
-              <a:rPr lang="pt-PT" sz="3200" i="1" dirty="0">
-                <a:solidFill>
-                  <a:schemeClr val="bg1">
-                    <a:lumMod val="50000"/>
-                  </a:schemeClr>
-                </a:solidFill>
-                <a:effectLst>
-                  <a:outerShdw blurRad="38100" dist="38100" dir="2700000" algn="tl">
-                    <a:srgbClr val="000000">
-                      <a:alpha val="43137"/>
-                    </a:srgbClr>
-                  </a:outerShdw>
-                </a:effectLst>
-              </a:rPr>
-              <a:t>Interface</a:t>
-            </a:r>
-          </a:p>
-        </p:txBody>
-      </p:sp>
-    </p:spTree>
-    <p:extLst>
-      <p:ext uri="{BB962C8B-B14F-4D97-AF65-F5344CB8AC3E}">
-        <p14:creationId xmlns:p14="http://schemas.microsoft.com/office/powerpoint/2010/main" val="2947764199"/>
-      </p:ext>
-    </p:extLst>
-  </p:cSld>
-  <p:clrMapOvr>
-    <a:masterClrMapping/>
-  </p:clrMapOvr>
-  <p:transition spd="slow">
-    <p:cover/>
-  </p:transition>
-</p:sld>
-</file>
-
-<file path=ppt/slides/slide8.xml><?xml version="1.0" encoding="utf-8"?>
-<p:sld xmlns:a="http://schemas.openxmlformats.org/drawingml/2006/main" xmlns:r="http://schemas.openxmlformats.org/officeDocument/2006/relationships" xmlns:p="http://schemas.openxmlformats.org/presentationml/2006/main">
-  <p:cSld>
-    <p:spTree>
-      <p:nvGrpSpPr>
-        <p:cNvPr id="1" name=""/>
-        <p:cNvGrpSpPr/>
-        <p:nvPr/>
-      </p:nvGrpSpPr>
-      <p:grpSpPr>
-        <a:xfrm>
-          <a:off x="0" y="0"/>
-          <a:ext cx="0" cy="0"/>
-          <a:chOff x="0" y="0"/>
-          <a:chExt cx="0" cy="0"/>
-        </a:xfrm>
-      </p:grpSpPr>
-      <p:sp>
-        <p:nvSpPr>
-          <p:cNvPr id="9" name="Título 8">
-            <a:extLst>
-              <a:ext uri="{FF2B5EF4-FFF2-40B4-BE49-F238E27FC236}">
-                <a16:creationId xmlns:a16="http://schemas.microsoft.com/office/drawing/2014/main" id="{2242052A-3CCC-4918-9A02-55A0F086A6AC}"/>
-              </a:ext>
-            </a:extLst>
-          </p:cNvPr>
-          <p:cNvSpPr>
-            <a:spLocks noGrp="1"/>
-          </p:cNvSpPr>
-          <p:nvPr>
-            <p:ph type="title"/>
-          </p:nvPr>
-        </p:nvSpPr>
-        <p:spPr/>
-        <p:txBody>
-          <a:bodyPr/>
-          <a:lstStyle/>
-          <a:p>
-            <a:r>
-              <a:rPr lang="pt-PT" dirty="0"/>
-              <a:t>Diálogo suportado pelo sistema (exemplo)</a:t>
-            </a:r>
-          </a:p>
-        </p:txBody>
-      </p:sp>
-      <p:sp>
-        <p:nvSpPr>
-          <p:cNvPr id="11" name="Marcador de Posição do Texto 10">
-            <a:extLst>
-              <a:ext uri="{FF2B5EF4-FFF2-40B4-BE49-F238E27FC236}">
-                <a16:creationId xmlns:a16="http://schemas.microsoft.com/office/drawing/2014/main" id="{861DA2B8-2C4C-499C-9373-7AF65343E67A}"/>
-              </a:ext>
-            </a:extLst>
-          </p:cNvPr>
-          <p:cNvSpPr>
-            <a:spLocks noGrp="1"/>
-          </p:cNvSpPr>
-          <p:nvPr>
-            <p:ph type="body" sz="half" idx="2"/>
-          </p:nvPr>
-        </p:nvSpPr>
-        <p:spPr/>
-        <p:txBody>
-          <a:bodyPr/>
-          <a:lstStyle/>
-          <a:p>
-            <a:r>
-              <a:rPr lang="pt-PT" dirty="0"/>
-              <a:t>Leonardo: Então Einstein, vamos a</a:t>
-            </a:r>
-            <a:br>
-              <a:rPr lang="pt-PT" dirty="0"/>
-            </a:br>
-            <a:r>
-              <a:rPr lang="pt-PT" dirty="0"/>
-              <a:t>                   mais um teste?</a:t>
-            </a:r>
-            <a:br>
-              <a:rPr lang="pt-PT" dirty="0"/>
-            </a:br>
-            <a:r>
-              <a:rPr lang="pt-PT" dirty="0"/>
-              <a:t>Utilizador: Eu sei tudo!</a:t>
-            </a:r>
-            <a:br>
-              <a:rPr lang="pt-PT" dirty="0"/>
-            </a:br>
-            <a:r>
-              <a:rPr lang="pt-PT" dirty="0"/>
-              <a:t>Leonardo : Escolhe o tema para</a:t>
-            </a:r>
-            <a:br>
-              <a:rPr lang="pt-PT" dirty="0"/>
-            </a:br>
-            <a:r>
-              <a:rPr lang="pt-PT" dirty="0"/>
-              <a:t>                    avaliação.</a:t>
-            </a:r>
-            <a:br>
-              <a:rPr lang="pt-PT" dirty="0"/>
-            </a:br>
-            <a:endParaRPr lang="pt-PT" dirty="0"/>
-          </a:p>
-          <a:p>
-            <a:r>
-              <a:rPr lang="pt-PT" dirty="0"/>
-              <a:t>(…)</a:t>
-            </a:r>
-            <a:br>
-              <a:rPr lang="pt-PT" dirty="0"/>
-            </a:br>
-            <a:r>
-              <a:rPr lang="pt-PT" dirty="0"/>
-              <a:t>* Aluno realiza um teste e termina com boa performance *</a:t>
-            </a:r>
-            <a:br>
-              <a:rPr lang="pt-PT" dirty="0"/>
-            </a:br>
-            <a:r>
-              <a:rPr lang="pt-PT" dirty="0"/>
-              <a:t>(…)</a:t>
-            </a:r>
-            <a:br>
-              <a:rPr lang="pt-PT" dirty="0"/>
-            </a:br>
-            <a:br>
-              <a:rPr lang="pt-PT" dirty="0"/>
-            </a:br>
-            <a:r>
-              <a:rPr lang="pt-PT" dirty="0"/>
-              <a:t>Leonardo: É para o 20.</a:t>
-            </a:r>
-          </a:p>
-        </p:txBody>
-      </p:sp>
-      <p:pic>
-        <p:nvPicPr>
-          <p:cNvPr id="6" name="Imagem 5">
-            <a:extLst>
-              <a:ext uri="{FF2B5EF4-FFF2-40B4-BE49-F238E27FC236}">
-                <a16:creationId xmlns:a16="http://schemas.microsoft.com/office/drawing/2014/main" id="{29C326E9-55EA-47E8-8815-2DF28E56CE08}"/>
-              </a:ext>
-            </a:extLst>
-          </p:cNvPr>
-          <p:cNvPicPr>
-            <a:picLocks noChangeAspect="1"/>
-          </p:cNvPicPr>
-          <p:nvPr/>
-        </p:nvPicPr>
-        <p:blipFill>
-          <a:blip r:embed="rId3">
-            <a:extLst>
-              <a:ext uri="{28A0092B-C50C-407E-A947-70E740481C1C}">
-                <a14:useLocalDpi xmlns:a14="http://schemas.microsoft.com/office/drawing/2010/main" val="0"/>
-              </a:ext>
-            </a:extLst>
-          </a:blip>
-          <a:stretch>
-            <a:fillRect/>
-          </a:stretch>
-        </p:blipFill>
-        <p:spPr>
-          <a:xfrm>
-            <a:off x="4257858" y="0"/>
-            <a:ext cx="4852275" cy="3641535"/>
-          </a:xfrm>
-          <a:prstGeom prst="rect">
-            <a:avLst/>
-          </a:prstGeom>
-        </p:spPr>
-      </p:pic>
-      <p:pic>
-        <p:nvPicPr>
-          <p:cNvPr id="8" name="Imagem 7">
-            <a:extLst>
-              <a:ext uri="{FF2B5EF4-FFF2-40B4-BE49-F238E27FC236}">
-                <a16:creationId xmlns:a16="http://schemas.microsoft.com/office/drawing/2014/main" id="{1E4737B7-0097-4870-AF81-03E8531FC890}"/>
-              </a:ext>
-            </a:extLst>
-          </p:cNvPr>
-          <p:cNvPicPr>
-            <a:picLocks noChangeAspect="1"/>
-          </p:cNvPicPr>
-          <p:nvPr/>
-        </p:nvPicPr>
-        <p:blipFill>
-          <a:blip r:embed="rId4">
-            <a:extLst>
-              <a:ext uri="{28A0092B-C50C-407E-A947-70E740481C1C}">
-                <a14:useLocalDpi xmlns:a14="http://schemas.microsoft.com/office/drawing/2010/main" val="0"/>
-              </a:ext>
-            </a:extLst>
-          </a:blip>
-          <a:stretch>
-            <a:fillRect/>
-          </a:stretch>
-        </p:blipFill>
-        <p:spPr>
-          <a:xfrm>
-            <a:off x="4299315" y="3641535"/>
-            <a:ext cx="5072409" cy="3198816"/>
-          </a:xfrm>
-          <a:prstGeom prst="rect">
-            <a:avLst/>
-          </a:prstGeom>
-        </p:spPr>
-      </p:pic>
-    </p:spTree>
-    <p:extLst>
-      <p:ext uri="{BB962C8B-B14F-4D97-AF65-F5344CB8AC3E}">
-        <p14:creationId xmlns:p14="http://schemas.microsoft.com/office/powerpoint/2010/main" val="2018381725"/>
-      </p:ext>
-    </p:extLst>
-  </p:cSld>
-  <p:clrMapOvr>
-    <a:masterClrMapping/>
-  </p:clrMapOvr>
-  <p:transition spd="slow">
-    <p:cover/>
-  </p:transition>
-</p:sld>
-</file>
-
-<file path=ppt/slides/slide9.xml><?xml version="1.0" encoding="utf-8"?>
-<p:sld xmlns:a="http://schemas.openxmlformats.org/drawingml/2006/main" xmlns:r="http://schemas.openxmlformats.org/officeDocument/2006/relationships" xmlns:p="http://schemas.openxmlformats.org/presentationml/2006/main">
-  <p:cSld>
-    <p:spTree>
-      <p:nvGrpSpPr>
-        <p:cNvPr id="1" name=""/>
-        <p:cNvGrpSpPr/>
-        <p:nvPr/>
-      </p:nvGrpSpPr>
-      <p:grpSpPr>
-        <a:xfrm>
-          <a:off x="0" y="0"/>
-          <a:ext cx="0" cy="0"/>
-          <a:chOff x="0" y="0"/>
-          <a:chExt cx="0" cy="0"/>
-        </a:xfrm>
-      </p:grpSpPr>
-      <p:sp>
-        <p:nvSpPr>
-          <p:cNvPr id="2" name="Título 1">
-            <a:extLst>
-              <a:ext uri="{FF2B5EF4-FFF2-40B4-BE49-F238E27FC236}">
-                <a16:creationId xmlns:a16="http://schemas.microsoft.com/office/drawing/2014/main" id="{D6A7957C-DC5E-4548-8077-D8829D44F171}"/>
-              </a:ext>
-            </a:extLst>
-          </p:cNvPr>
-          <p:cNvSpPr>
-            <a:spLocks noGrp="1"/>
-          </p:cNvSpPr>
-          <p:nvPr>
-            <p:ph type="title"/>
-          </p:nvPr>
-        </p:nvSpPr>
-        <p:spPr/>
-        <p:txBody>
-          <a:bodyPr/>
-          <a:lstStyle/>
-          <a:p>
-            <a:r>
-              <a:rPr lang="pt-PT" dirty="0">
-                <a:solidFill>
-                  <a:schemeClr val="bg1">
-                    <a:lumMod val="50000"/>
-                  </a:schemeClr>
-                </a:solidFill>
-              </a:rPr>
-              <a:t>Ferramentas utilizadas</a:t>
-            </a:r>
-          </a:p>
-        </p:txBody>
-      </p:sp>
-      <p:pic>
-        <p:nvPicPr>
-          <p:cNvPr id="5" name="Imagem 4">
-            <a:extLst>
-              <a:ext uri="{FF2B5EF4-FFF2-40B4-BE49-F238E27FC236}">
-                <a16:creationId xmlns:a16="http://schemas.microsoft.com/office/drawing/2014/main" id="{314C4566-E3D5-4C54-8686-5B9ECE2D9E35}"/>
-              </a:ext>
-            </a:extLst>
-          </p:cNvPr>
-          <p:cNvPicPr>
-            <a:picLocks noChangeAspect="1"/>
-          </p:cNvPicPr>
-          <p:nvPr/>
-        </p:nvPicPr>
-        <p:blipFill>
-          <a:blip r:embed="rId3">
-            <a:extLst>
-              <a:ext uri="{28A0092B-C50C-407E-A947-70E740481C1C}">
-                <a14:useLocalDpi xmlns:a14="http://schemas.microsoft.com/office/drawing/2010/main" val="0"/>
-              </a:ext>
-            </a:extLst>
-          </a:blip>
-          <a:stretch>
-            <a:fillRect/>
-          </a:stretch>
-        </p:blipFill>
-        <p:spPr>
-          <a:xfrm>
-            <a:off x="6781586" y="4431467"/>
-            <a:ext cx="4162425" cy="1095375"/>
-          </a:xfrm>
-          <a:prstGeom prst="rect">
-            <a:avLst/>
-          </a:prstGeom>
-        </p:spPr>
-      </p:pic>
-      <p:pic>
-        <p:nvPicPr>
-          <p:cNvPr id="7" name="Imagem 6">
-            <a:extLst>
-              <a:ext uri="{FF2B5EF4-FFF2-40B4-BE49-F238E27FC236}">
-                <a16:creationId xmlns:a16="http://schemas.microsoft.com/office/drawing/2014/main" id="{896B0D0B-613F-40CF-9E5B-ED2D0E0E299E}"/>
-              </a:ext>
-            </a:extLst>
-          </p:cNvPr>
-          <p:cNvPicPr>
-            <a:picLocks noChangeAspect="1"/>
-          </p:cNvPicPr>
-          <p:nvPr/>
-        </p:nvPicPr>
-        <p:blipFill>
-          <a:blip r:embed="rId4">
-            <a:extLst>
-              <a:ext uri="{28A0092B-C50C-407E-A947-70E740481C1C}">
-                <a14:useLocalDpi xmlns:a14="http://schemas.microsoft.com/office/drawing/2010/main" val="0"/>
-              </a:ext>
-            </a:extLst>
-          </a:blip>
-          <a:stretch>
-            <a:fillRect/>
-          </a:stretch>
-        </p:blipFill>
-        <p:spPr>
-          <a:xfrm>
-            <a:off x="6857359" y="1827256"/>
-            <a:ext cx="3664800" cy="1752730"/>
-          </a:xfrm>
-          <a:prstGeom prst="rect">
-            <a:avLst/>
-          </a:prstGeom>
-        </p:spPr>
-      </p:pic>
-      <p:pic>
-        <p:nvPicPr>
-          <p:cNvPr id="9" name="Imagem 8">
-            <a:extLst>
-              <a:ext uri="{FF2B5EF4-FFF2-40B4-BE49-F238E27FC236}">
-                <a16:creationId xmlns:a16="http://schemas.microsoft.com/office/drawing/2014/main" id="{36CC0437-23EE-4BD1-ADC3-A33696204AFF}"/>
-              </a:ext>
-            </a:extLst>
-          </p:cNvPr>
-          <p:cNvPicPr>
-            <a:picLocks noChangeAspect="1"/>
-          </p:cNvPicPr>
-          <p:nvPr/>
-        </p:nvPicPr>
-        <p:blipFill>
-          <a:blip r:embed="rId5" cstate="hqprint">
-            <a:extLst>
-              <a:ext uri="{28A0092B-C50C-407E-A947-70E740481C1C}">
-                <a14:useLocalDpi xmlns:a14="http://schemas.microsoft.com/office/drawing/2010/main" val="0"/>
-              </a:ext>
-            </a:extLst>
-          </a:blip>
-          <a:stretch>
-            <a:fillRect/>
-          </a:stretch>
-        </p:blipFill>
-        <p:spPr>
-          <a:xfrm>
-            <a:off x="1038300" y="2022537"/>
-            <a:ext cx="4296342" cy="1450757"/>
-          </a:xfrm>
-          <a:prstGeom prst="rect">
-            <a:avLst/>
-          </a:prstGeom>
-        </p:spPr>
-      </p:pic>
-      <p:pic>
-        <p:nvPicPr>
-          <p:cNvPr id="11" name="Imagem 10">
-            <a:extLst>
-              <a:ext uri="{FF2B5EF4-FFF2-40B4-BE49-F238E27FC236}">
-                <a16:creationId xmlns:a16="http://schemas.microsoft.com/office/drawing/2014/main" id="{56C23E1A-3E18-429C-9802-D27661FD0B1C}"/>
-              </a:ext>
-            </a:extLst>
-          </p:cNvPr>
-          <p:cNvPicPr>
-            <a:picLocks noChangeAspect="1"/>
-          </p:cNvPicPr>
-          <p:nvPr/>
-        </p:nvPicPr>
-        <p:blipFill>
-          <a:blip r:embed="rId6">
-            <a:extLst>
-              <a:ext uri="{28A0092B-C50C-407E-A947-70E740481C1C}">
-                <a14:useLocalDpi xmlns:a14="http://schemas.microsoft.com/office/drawing/2010/main" val="0"/>
-              </a:ext>
-            </a:extLst>
-          </a:blip>
-          <a:stretch>
-            <a:fillRect/>
-          </a:stretch>
-        </p:blipFill>
-        <p:spPr>
-          <a:xfrm>
-            <a:off x="1301122" y="3579986"/>
-            <a:ext cx="4033520" cy="2016760"/>
-          </a:xfrm>
-          <a:prstGeom prst="rect">
-            <a:avLst/>
-          </a:prstGeom>
-        </p:spPr>
-      </p:pic>
-    </p:spTree>
-    <p:extLst>
-      <p:ext uri="{BB962C8B-B14F-4D97-AF65-F5344CB8AC3E}">
-        <p14:creationId xmlns:p14="http://schemas.microsoft.com/office/powerpoint/2010/main" val="1279032532"/>
       </p:ext>
     </p:extLst>
   </p:cSld>

</xml_diff>